<commit_message>
Adicionadas aulas de mapenamento
</commit_message>
<xml_diff>
--- a/2808.pptx
+++ b/2808.pptx
@@ -5,7 +5,7 @@
     <p:sldMasterId id="2147483648" r:id="rId1"/>
   </p:sldMasterIdLst>
   <p:notesMasterIdLst>
-    <p:notesMasterId r:id="rId13"/>
+    <p:notesMasterId r:id="rId20"/>
   </p:notesMasterIdLst>
   <p:sldIdLst>
     <p:sldId id="260" r:id="rId2"/>
@@ -18,7 +18,14 @@
     <p:sldId id="483" r:id="rId9"/>
     <p:sldId id="484" r:id="rId10"/>
     <p:sldId id="485" r:id="rId11"/>
-    <p:sldId id="265" r:id="rId12"/>
+    <p:sldId id="486" r:id="rId12"/>
+    <p:sldId id="487" r:id="rId13"/>
+    <p:sldId id="488" r:id="rId14"/>
+    <p:sldId id="489" r:id="rId15"/>
+    <p:sldId id="490" r:id="rId16"/>
+    <p:sldId id="491" r:id="rId17"/>
+    <p:sldId id="492" r:id="rId18"/>
+    <p:sldId id="265" r:id="rId19"/>
   </p:sldIdLst>
   <p:sldSz cx="12192000" cy="6858000"/>
   <p:notesSz cx="6858000" cy="9144000"/>
@@ -3723,7 +3730,7 @@
           <a:p>
             <a:fld id="{2232590A-2ECD-4930-A16F-BAB4FCA317C7}" type="datetimeFigureOut">
               <a:rPr lang="pt-BR" smtClean="0"/>
-              <a:t>03/08/2021</a:t>
+              <a:t>12/08/2021</a:t>
             </a:fld>
             <a:endParaRPr lang="pt-BR"/>
           </a:p>
@@ -3881,7 +3888,7 @@
           <a:p>
             <a:fld id="{1BFBF4EA-A19C-4108-A664-D5EED1568F94}" type="slidenum">
               <a:rPr lang="pt-BR" smtClean="0"/>
-              <a:t>‹#›</a:t>
+              <a:t>‹nº›</a:t>
             </a:fld>
             <a:endParaRPr lang="pt-BR"/>
           </a:p>
@@ -4256,6 +4263,601 @@
 </p:notes>
 </file>
 
+<file path=ppt/notesSlides/notesSlide4.xml><?xml version="1.0" encoding="utf-8"?>
+<p:notes xmlns:a="http://schemas.openxmlformats.org/drawingml/2006/main" xmlns:r="http://schemas.openxmlformats.org/officeDocument/2006/relationships" xmlns:p="http://schemas.openxmlformats.org/presentationml/2006/main">
+  <p:cSld>
+    <p:spTree>
+      <p:nvGrpSpPr>
+        <p:cNvPr id="1" name=""/>
+        <p:cNvGrpSpPr/>
+        <p:nvPr/>
+      </p:nvGrpSpPr>
+      <p:grpSpPr>
+        <a:xfrm>
+          <a:off x="0" y="0"/>
+          <a:ext cx="0" cy="0"/>
+          <a:chOff x="0" y="0"/>
+          <a:chExt cx="0" cy="0"/>
+        </a:xfrm>
+      </p:grpSpPr>
+      <p:sp>
+        <p:nvSpPr>
+          <p:cNvPr id="2" name="Espaço Reservado para Imagem de Slide 1"/>
+          <p:cNvSpPr>
+            <a:spLocks noGrp="1" noRot="1" noChangeAspect="1"/>
+          </p:cNvSpPr>
+          <p:nvPr>
+            <p:ph type="sldImg"/>
+          </p:nvPr>
+        </p:nvSpPr>
+        <p:spPr/>
+      </p:sp>
+      <p:sp>
+        <p:nvSpPr>
+          <p:cNvPr id="3" name="Espaço Reservado para Anotações 2"/>
+          <p:cNvSpPr>
+            <a:spLocks noGrp="1"/>
+          </p:cNvSpPr>
+          <p:nvPr>
+            <p:ph type="body" idx="1"/>
+          </p:nvPr>
+        </p:nvSpPr>
+        <p:spPr/>
+        <p:txBody>
+          <a:bodyPr/>
+          <a:lstStyle/>
+          <a:p>
+            <a:r>
+              <a:rPr lang="en-US" dirty="0"/>
+              <a:t>- </a:t>
+            </a:r>
+            <a:r>
+              <a:rPr lang="en-US" dirty="0" err="1"/>
+              <a:t>Startar</a:t>
+            </a:r>
+            <a:r>
+              <a:rPr lang="en-US" dirty="0"/>
+              <a:t> o docker</a:t>
+            </a:r>
+          </a:p>
+          <a:p>
+            <a:r>
+              <a:rPr lang="en-US" dirty="0"/>
+              <a:t>- </a:t>
+            </a:r>
+            <a:r>
+              <a:rPr lang="en-US" dirty="0" err="1"/>
+              <a:t>Restaurar</a:t>
+            </a:r>
+            <a:r>
+              <a:rPr lang="en-US" dirty="0"/>
+              <a:t> o banco de dados</a:t>
+            </a:r>
+          </a:p>
+        </p:txBody>
+      </p:sp>
+      <p:sp>
+        <p:nvSpPr>
+          <p:cNvPr id="4" name="Espaço Reservado para Número de Slide 3"/>
+          <p:cNvSpPr>
+            <a:spLocks noGrp="1"/>
+          </p:cNvSpPr>
+          <p:nvPr>
+            <p:ph type="sldNum" sz="quarter" idx="5"/>
+          </p:nvPr>
+        </p:nvSpPr>
+        <p:spPr/>
+        <p:txBody>
+          <a:bodyPr/>
+          <a:lstStyle/>
+          <a:p>
+            <a:fld id="{1BFBF4EA-A19C-4108-A664-D5EED1568F94}" type="slidenum">
+              <a:rPr lang="pt-BR" smtClean="0"/>
+              <a:t>11</a:t>
+            </a:fld>
+            <a:endParaRPr lang="pt-BR"/>
+          </a:p>
+        </p:txBody>
+      </p:sp>
+    </p:spTree>
+    <p:extLst>
+      <p:ext uri="{BB962C8B-B14F-4D97-AF65-F5344CB8AC3E}">
+        <p14:creationId xmlns:p14="http://schemas.microsoft.com/office/powerpoint/2010/main" val="3191576415"/>
+      </p:ext>
+    </p:extLst>
+  </p:cSld>
+  <p:clrMapOvr>
+    <a:masterClrMapping/>
+  </p:clrMapOvr>
+</p:notes>
+</file>
+
+<file path=ppt/notesSlides/notesSlide5.xml><?xml version="1.0" encoding="utf-8"?>
+<p:notes xmlns:a="http://schemas.openxmlformats.org/drawingml/2006/main" xmlns:r="http://schemas.openxmlformats.org/officeDocument/2006/relationships" xmlns:p="http://schemas.openxmlformats.org/presentationml/2006/main">
+  <p:cSld>
+    <p:spTree>
+      <p:nvGrpSpPr>
+        <p:cNvPr id="1" name=""/>
+        <p:cNvGrpSpPr/>
+        <p:nvPr/>
+      </p:nvGrpSpPr>
+      <p:grpSpPr>
+        <a:xfrm>
+          <a:off x="0" y="0"/>
+          <a:ext cx="0" cy="0"/>
+          <a:chOff x="0" y="0"/>
+          <a:chExt cx="0" cy="0"/>
+        </a:xfrm>
+      </p:grpSpPr>
+      <p:sp>
+        <p:nvSpPr>
+          <p:cNvPr id="2" name="Espaço Reservado para Imagem de Slide 1"/>
+          <p:cNvSpPr>
+            <a:spLocks noGrp="1" noRot="1" noChangeAspect="1"/>
+          </p:cNvSpPr>
+          <p:nvPr>
+            <p:ph type="sldImg"/>
+          </p:nvPr>
+        </p:nvSpPr>
+        <p:spPr/>
+      </p:sp>
+      <p:sp>
+        <p:nvSpPr>
+          <p:cNvPr id="3" name="Espaço Reservado para Anotações 2"/>
+          <p:cNvSpPr>
+            <a:spLocks noGrp="1"/>
+          </p:cNvSpPr>
+          <p:nvPr>
+            <p:ph type="body" idx="1"/>
+          </p:nvPr>
+        </p:nvSpPr>
+        <p:spPr/>
+        <p:txBody>
+          <a:bodyPr/>
+          <a:lstStyle/>
+          <a:p>
+            <a:r>
+              <a:rPr lang="en-US" dirty="0"/>
+              <a:t>- </a:t>
+            </a:r>
+            <a:r>
+              <a:rPr lang="en-US" dirty="0" err="1"/>
+              <a:t>Criar</a:t>
+            </a:r>
+            <a:r>
+              <a:rPr lang="en-US" dirty="0"/>
+              <a:t> as </a:t>
+            </a:r>
+            <a:r>
+              <a:rPr lang="en-US" dirty="0" err="1"/>
+              <a:t>entidades</a:t>
+            </a:r>
+            <a:endParaRPr lang="en-US" dirty="0"/>
+          </a:p>
+          <a:p>
+            <a:endParaRPr lang="en-US" dirty="0"/>
+          </a:p>
+          <a:p>
+            <a:endParaRPr lang="en-US" dirty="0"/>
+          </a:p>
+        </p:txBody>
+      </p:sp>
+      <p:sp>
+        <p:nvSpPr>
+          <p:cNvPr id="4" name="Espaço Reservado para Número de Slide 3"/>
+          <p:cNvSpPr>
+            <a:spLocks noGrp="1"/>
+          </p:cNvSpPr>
+          <p:nvPr>
+            <p:ph type="sldNum" sz="quarter" idx="5"/>
+          </p:nvPr>
+        </p:nvSpPr>
+        <p:spPr/>
+        <p:txBody>
+          <a:bodyPr/>
+          <a:lstStyle/>
+          <a:p>
+            <a:fld id="{1BFBF4EA-A19C-4108-A664-D5EED1568F94}" type="slidenum">
+              <a:rPr lang="pt-BR" smtClean="0"/>
+              <a:t>12</a:t>
+            </a:fld>
+            <a:endParaRPr lang="pt-BR"/>
+          </a:p>
+        </p:txBody>
+      </p:sp>
+    </p:spTree>
+    <p:extLst>
+      <p:ext uri="{BB962C8B-B14F-4D97-AF65-F5344CB8AC3E}">
+        <p14:creationId xmlns:p14="http://schemas.microsoft.com/office/powerpoint/2010/main" val="1360175335"/>
+      </p:ext>
+    </p:extLst>
+  </p:cSld>
+  <p:clrMapOvr>
+    <a:masterClrMapping/>
+  </p:clrMapOvr>
+</p:notes>
+</file>
+
+<file path=ppt/notesSlides/notesSlide6.xml><?xml version="1.0" encoding="utf-8"?>
+<p:notes xmlns:a="http://schemas.openxmlformats.org/drawingml/2006/main" xmlns:r="http://schemas.openxmlformats.org/officeDocument/2006/relationships" xmlns:p="http://schemas.openxmlformats.org/presentationml/2006/main">
+  <p:cSld>
+    <p:spTree>
+      <p:nvGrpSpPr>
+        <p:cNvPr id="1" name=""/>
+        <p:cNvGrpSpPr/>
+        <p:nvPr/>
+      </p:nvGrpSpPr>
+      <p:grpSpPr>
+        <a:xfrm>
+          <a:off x="0" y="0"/>
+          <a:ext cx="0" cy="0"/>
+          <a:chOff x="0" y="0"/>
+          <a:chExt cx="0" cy="0"/>
+        </a:xfrm>
+      </p:grpSpPr>
+      <p:sp>
+        <p:nvSpPr>
+          <p:cNvPr id="2" name="Espaço Reservado para Imagem de Slide 1"/>
+          <p:cNvSpPr>
+            <a:spLocks noGrp="1" noRot="1" noChangeAspect="1"/>
+          </p:cNvSpPr>
+          <p:nvPr>
+            <p:ph type="sldImg"/>
+          </p:nvPr>
+        </p:nvSpPr>
+        <p:spPr/>
+      </p:sp>
+      <p:sp>
+        <p:nvSpPr>
+          <p:cNvPr id="3" name="Espaço Reservado para Anotações 2"/>
+          <p:cNvSpPr>
+            <a:spLocks noGrp="1"/>
+          </p:cNvSpPr>
+          <p:nvPr>
+            <p:ph type="body" idx="1"/>
+          </p:nvPr>
+        </p:nvSpPr>
+        <p:spPr/>
+        <p:txBody>
+          <a:bodyPr/>
+          <a:lstStyle/>
+          <a:p>
+            <a:r>
+              <a:rPr lang="en-US" dirty="0"/>
+              <a:t>- </a:t>
+            </a:r>
+            <a:r>
+              <a:rPr lang="en-US" dirty="0" err="1"/>
+              <a:t>Criar</a:t>
+            </a:r>
+            <a:r>
+              <a:rPr lang="en-US" dirty="0"/>
+              <a:t> as </a:t>
+            </a:r>
+            <a:r>
+              <a:rPr lang="en-US" dirty="0" err="1"/>
+              <a:t>entidades</a:t>
+            </a:r>
+            <a:endParaRPr lang="en-US" dirty="0"/>
+          </a:p>
+          <a:p>
+            <a:endParaRPr lang="en-US" dirty="0"/>
+          </a:p>
+          <a:p>
+            <a:endParaRPr lang="en-US" dirty="0"/>
+          </a:p>
+        </p:txBody>
+      </p:sp>
+      <p:sp>
+        <p:nvSpPr>
+          <p:cNvPr id="4" name="Espaço Reservado para Número de Slide 3"/>
+          <p:cNvSpPr>
+            <a:spLocks noGrp="1"/>
+          </p:cNvSpPr>
+          <p:nvPr>
+            <p:ph type="sldNum" sz="quarter" idx="5"/>
+          </p:nvPr>
+        </p:nvSpPr>
+        <p:spPr/>
+        <p:txBody>
+          <a:bodyPr/>
+          <a:lstStyle/>
+          <a:p>
+            <a:fld id="{1BFBF4EA-A19C-4108-A664-D5EED1568F94}" type="slidenum">
+              <a:rPr lang="pt-BR" smtClean="0"/>
+              <a:t>13</a:t>
+            </a:fld>
+            <a:endParaRPr lang="pt-BR"/>
+          </a:p>
+        </p:txBody>
+      </p:sp>
+    </p:spTree>
+    <p:extLst>
+      <p:ext uri="{BB962C8B-B14F-4D97-AF65-F5344CB8AC3E}">
+        <p14:creationId xmlns:p14="http://schemas.microsoft.com/office/powerpoint/2010/main" val="4150210867"/>
+      </p:ext>
+    </p:extLst>
+  </p:cSld>
+  <p:clrMapOvr>
+    <a:masterClrMapping/>
+  </p:clrMapOvr>
+</p:notes>
+</file>
+
+<file path=ppt/notesSlides/notesSlide7.xml><?xml version="1.0" encoding="utf-8"?>
+<p:notes xmlns:a="http://schemas.openxmlformats.org/drawingml/2006/main" xmlns:r="http://schemas.openxmlformats.org/officeDocument/2006/relationships" xmlns:p="http://schemas.openxmlformats.org/presentationml/2006/main">
+  <p:cSld>
+    <p:spTree>
+      <p:nvGrpSpPr>
+        <p:cNvPr id="1" name=""/>
+        <p:cNvGrpSpPr/>
+        <p:nvPr/>
+      </p:nvGrpSpPr>
+      <p:grpSpPr>
+        <a:xfrm>
+          <a:off x="0" y="0"/>
+          <a:ext cx="0" cy="0"/>
+          <a:chOff x="0" y="0"/>
+          <a:chExt cx="0" cy="0"/>
+        </a:xfrm>
+      </p:grpSpPr>
+      <p:sp>
+        <p:nvSpPr>
+          <p:cNvPr id="2" name="Espaço Reservado para Imagem de Slide 1"/>
+          <p:cNvSpPr>
+            <a:spLocks noGrp="1" noRot="1" noChangeAspect="1"/>
+          </p:cNvSpPr>
+          <p:nvPr>
+            <p:ph type="sldImg"/>
+          </p:nvPr>
+        </p:nvSpPr>
+        <p:spPr/>
+      </p:sp>
+      <p:sp>
+        <p:nvSpPr>
+          <p:cNvPr id="3" name="Espaço Reservado para Anotações 2"/>
+          <p:cNvSpPr>
+            <a:spLocks noGrp="1"/>
+          </p:cNvSpPr>
+          <p:nvPr>
+            <p:ph type="body" idx="1"/>
+          </p:nvPr>
+        </p:nvSpPr>
+        <p:spPr/>
+        <p:txBody>
+          <a:bodyPr/>
+          <a:lstStyle/>
+          <a:p>
+            <a:r>
+              <a:rPr lang="en-US" dirty="0"/>
+              <a:t>- </a:t>
+            </a:r>
+            <a:r>
+              <a:rPr lang="en-US" dirty="0" err="1"/>
+              <a:t>Criar</a:t>
+            </a:r>
+            <a:r>
+              <a:rPr lang="en-US" dirty="0"/>
+              <a:t> as </a:t>
+            </a:r>
+            <a:r>
+              <a:rPr lang="en-US" dirty="0" err="1"/>
+              <a:t>entidades</a:t>
+            </a:r>
+            <a:endParaRPr lang="en-US" dirty="0"/>
+          </a:p>
+          <a:p>
+            <a:endParaRPr lang="en-US" dirty="0"/>
+          </a:p>
+          <a:p>
+            <a:endParaRPr lang="en-US" dirty="0"/>
+          </a:p>
+        </p:txBody>
+      </p:sp>
+      <p:sp>
+        <p:nvSpPr>
+          <p:cNvPr id="4" name="Espaço Reservado para Número de Slide 3"/>
+          <p:cNvSpPr>
+            <a:spLocks noGrp="1"/>
+          </p:cNvSpPr>
+          <p:nvPr>
+            <p:ph type="sldNum" sz="quarter" idx="5"/>
+          </p:nvPr>
+        </p:nvSpPr>
+        <p:spPr/>
+        <p:txBody>
+          <a:bodyPr/>
+          <a:lstStyle/>
+          <a:p>
+            <a:fld id="{1BFBF4EA-A19C-4108-A664-D5EED1568F94}" type="slidenum">
+              <a:rPr lang="pt-BR" smtClean="0"/>
+              <a:t>14</a:t>
+            </a:fld>
+            <a:endParaRPr lang="pt-BR"/>
+          </a:p>
+        </p:txBody>
+      </p:sp>
+    </p:spTree>
+    <p:extLst>
+      <p:ext uri="{BB962C8B-B14F-4D97-AF65-F5344CB8AC3E}">
+        <p14:creationId xmlns:p14="http://schemas.microsoft.com/office/powerpoint/2010/main" val="2687007809"/>
+      </p:ext>
+    </p:extLst>
+  </p:cSld>
+  <p:clrMapOvr>
+    <a:masterClrMapping/>
+  </p:clrMapOvr>
+</p:notes>
+</file>
+
+<file path=ppt/notesSlides/notesSlide8.xml><?xml version="1.0" encoding="utf-8"?>
+<p:notes xmlns:a="http://schemas.openxmlformats.org/drawingml/2006/main" xmlns:r="http://schemas.openxmlformats.org/officeDocument/2006/relationships" xmlns:p="http://schemas.openxmlformats.org/presentationml/2006/main">
+  <p:cSld>
+    <p:spTree>
+      <p:nvGrpSpPr>
+        <p:cNvPr id="1" name=""/>
+        <p:cNvGrpSpPr/>
+        <p:nvPr/>
+      </p:nvGrpSpPr>
+      <p:grpSpPr>
+        <a:xfrm>
+          <a:off x="0" y="0"/>
+          <a:ext cx="0" cy="0"/>
+          <a:chOff x="0" y="0"/>
+          <a:chExt cx="0" cy="0"/>
+        </a:xfrm>
+      </p:grpSpPr>
+      <p:sp>
+        <p:nvSpPr>
+          <p:cNvPr id="2" name="Espaço Reservado para Imagem de Slide 1"/>
+          <p:cNvSpPr>
+            <a:spLocks noGrp="1" noRot="1" noChangeAspect="1"/>
+          </p:cNvSpPr>
+          <p:nvPr>
+            <p:ph type="sldImg"/>
+          </p:nvPr>
+        </p:nvSpPr>
+        <p:spPr/>
+      </p:sp>
+      <p:sp>
+        <p:nvSpPr>
+          <p:cNvPr id="3" name="Espaço Reservado para Anotações 2"/>
+          <p:cNvSpPr>
+            <a:spLocks noGrp="1"/>
+          </p:cNvSpPr>
+          <p:nvPr>
+            <p:ph type="body" idx="1"/>
+          </p:nvPr>
+        </p:nvSpPr>
+        <p:spPr/>
+        <p:txBody>
+          <a:bodyPr/>
+          <a:lstStyle/>
+          <a:p>
+            <a:endParaRPr lang="en-US" dirty="0"/>
+          </a:p>
+        </p:txBody>
+      </p:sp>
+      <p:sp>
+        <p:nvSpPr>
+          <p:cNvPr id="4" name="Espaço Reservado para Número de Slide 3"/>
+          <p:cNvSpPr>
+            <a:spLocks noGrp="1"/>
+          </p:cNvSpPr>
+          <p:nvPr>
+            <p:ph type="sldNum" sz="quarter" idx="5"/>
+          </p:nvPr>
+        </p:nvSpPr>
+        <p:spPr/>
+        <p:txBody>
+          <a:bodyPr/>
+          <a:lstStyle/>
+          <a:p>
+            <a:fld id="{1BFBF4EA-A19C-4108-A664-D5EED1568F94}" type="slidenum">
+              <a:rPr lang="pt-BR" smtClean="0"/>
+              <a:t>16</a:t>
+            </a:fld>
+            <a:endParaRPr lang="pt-BR"/>
+          </a:p>
+        </p:txBody>
+      </p:sp>
+    </p:spTree>
+    <p:extLst>
+      <p:ext uri="{BB962C8B-B14F-4D97-AF65-F5344CB8AC3E}">
+        <p14:creationId xmlns:p14="http://schemas.microsoft.com/office/powerpoint/2010/main" val="3818658525"/>
+      </p:ext>
+    </p:extLst>
+  </p:cSld>
+  <p:clrMapOvr>
+    <a:masterClrMapping/>
+  </p:clrMapOvr>
+</p:notes>
+</file>
+
+<file path=ppt/notesSlides/notesSlide9.xml><?xml version="1.0" encoding="utf-8"?>
+<p:notes xmlns:a="http://schemas.openxmlformats.org/drawingml/2006/main" xmlns:r="http://schemas.openxmlformats.org/officeDocument/2006/relationships" xmlns:p="http://schemas.openxmlformats.org/presentationml/2006/main">
+  <p:cSld>
+    <p:spTree>
+      <p:nvGrpSpPr>
+        <p:cNvPr id="1" name=""/>
+        <p:cNvGrpSpPr/>
+        <p:nvPr/>
+      </p:nvGrpSpPr>
+      <p:grpSpPr>
+        <a:xfrm>
+          <a:off x="0" y="0"/>
+          <a:ext cx="0" cy="0"/>
+          <a:chOff x="0" y="0"/>
+          <a:chExt cx="0" cy="0"/>
+        </a:xfrm>
+      </p:grpSpPr>
+      <p:sp>
+        <p:nvSpPr>
+          <p:cNvPr id="2" name="Espaço Reservado para Imagem de Slide 1"/>
+          <p:cNvSpPr>
+            <a:spLocks noGrp="1" noRot="1" noChangeAspect="1"/>
+          </p:cNvSpPr>
+          <p:nvPr>
+            <p:ph type="sldImg"/>
+          </p:nvPr>
+        </p:nvSpPr>
+        <p:spPr/>
+      </p:sp>
+      <p:sp>
+        <p:nvSpPr>
+          <p:cNvPr id="3" name="Espaço Reservado para Anotações 2"/>
+          <p:cNvSpPr>
+            <a:spLocks noGrp="1"/>
+          </p:cNvSpPr>
+          <p:nvPr>
+            <p:ph type="body" idx="1"/>
+          </p:nvPr>
+        </p:nvSpPr>
+        <p:spPr/>
+        <p:txBody>
+          <a:bodyPr/>
+          <a:lstStyle/>
+          <a:p>
+            <a:endParaRPr lang="en-US" dirty="0"/>
+          </a:p>
+        </p:txBody>
+      </p:sp>
+      <p:sp>
+        <p:nvSpPr>
+          <p:cNvPr id="4" name="Espaço Reservado para Número de Slide 3"/>
+          <p:cNvSpPr>
+            <a:spLocks noGrp="1"/>
+          </p:cNvSpPr>
+          <p:nvPr>
+            <p:ph type="sldNum" sz="quarter" idx="5"/>
+          </p:nvPr>
+        </p:nvSpPr>
+        <p:spPr/>
+        <p:txBody>
+          <a:bodyPr/>
+          <a:lstStyle/>
+          <a:p>
+            <a:fld id="{1BFBF4EA-A19C-4108-A664-D5EED1568F94}" type="slidenum">
+              <a:rPr lang="pt-BR" smtClean="0"/>
+              <a:t>17</a:t>
+            </a:fld>
+            <a:endParaRPr lang="pt-BR"/>
+          </a:p>
+        </p:txBody>
+      </p:sp>
+    </p:spTree>
+    <p:extLst>
+      <p:ext uri="{BB962C8B-B14F-4D97-AF65-F5344CB8AC3E}">
+        <p14:creationId xmlns:p14="http://schemas.microsoft.com/office/powerpoint/2010/main" val="1094046726"/>
+      </p:ext>
+    </p:extLst>
+  </p:cSld>
+  <p:clrMapOvr>
+    <a:masterClrMapping/>
+  </p:clrMapOvr>
+</p:notes>
+</file>
+
 <file path=ppt/slideLayouts/slideLayout1.xml><?xml version="1.0" encoding="utf-8"?>
 <p:sldLayout xmlns:a="http://schemas.openxmlformats.org/drawingml/2006/main" xmlns:r="http://schemas.openxmlformats.org/officeDocument/2006/relationships" xmlns:p="http://schemas.openxmlformats.org/presentationml/2006/main" type="title" preserve="1">
   <p:cSld name="Slide de Título">
@@ -4403,7 +5005,7 @@
           <a:p>
             <a:fld id="{358D75C1-F3B0-4D81-A190-EFDBB1D1AFEE}" type="datetimeFigureOut">
               <a:rPr lang="pt-BR" smtClean="0"/>
-              <a:t>03/08/2021</a:t>
+              <a:t>12/08/2021</a:t>
             </a:fld>
             <a:endParaRPr lang="pt-BR"/>
           </a:p>
@@ -4457,7 +5059,7 @@
           <a:p>
             <a:fld id="{F6DAF70D-9E8B-4ED6-9311-5F4D3EA89BB5}" type="slidenum">
               <a:rPr lang="pt-BR" smtClean="0"/>
-              <a:t>‹#›</a:t>
+              <a:t>‹nº›</a:t>
             </a:fld>
             <a:endParaRPr lang="pt-BR"/>
           </a:p>
@@ -4601,7 +5203,7 @@
           <a:p>
             <a:fld id="{358D75C1-F3B0-4D81-A190-EFDBB1D1AFEE}" type="datetimeFigureOut">
               <a:rPr lang="pt-BR" smtClean="0"/>
-              <a:t>03/08/2021</a:t>
+              <a:t>12/08/2021</a:t>
             </a:fld>
             <a:endParaRPr lang="pt-BR"/>
           </a:p>
@@ -4655,7 +5257,7 @@
           <a:p>
             <a:fld id="{F6DAF70D-9E8B-4ED6-9311-5F4D3EA89BB5}" type="slidenum">
               <a:rPr lang="pt-BR" smtClean="0"/>
-              <a:t>‹#›</a:t>
+              <a:t>‹nº›</a:t>
             </a:fld>
             <a:endParaRPr lang="pt-BR"/>
           </a:p>
@@ -4809,7 +5411,7 @@
           <a:p>
             <a:fld id="{358D75C1-F3B0-4D81-A190-EFDBB1D1AFEE}" type="datetimeFigureOut">
               <a:rPr lang="pt-BR" smtClean="0"/>
-              <a:t>03/08/2021</a:t>
+              <a:t>12/08/2021</a:t>
             </a:fld>
             <a:endParaRPr lang="pt-BR"/>
           </a:p>
@@ -4863,7 +5465,7 @@
           <a:p>
             <a:fld id="{F6DAF70D-9E8B-4ED6-9311-5F4D3EA89BB5}" type="slidenum">
               <a:rPr lang="pt-BR" smtClean="0"/>
-              <a:t>‹#›</a:t>
+              <a:t>‹nº›</a:t>
             </a:fld>
             <a:endParaRPr lang="pt-BR"/>
           </a:p>
@@ -5007,7 +5609,7 @@
           <a:p>
             <a:fld id="{358D75C1-F3B0-4D81-A190-EFDBB1D1AFEE}" type="datetimeFigureOut">
               <a:rPr lang="pt-BR" smtClean="0"/>
-              <a:t>03/08/2021</a:t>
+              <a:t>12/08/2021</a:t>
             </a:fld>
             <a:endParaRPr lang="pt-BR"/>
           </a:p>
@@ -5061,7 +5663,7 @@
           <a:p>
             <a:fld id="{F6DAF70D-9E8B-4ED6-9311-5F4D3EA89BB5}" type="slidenum">
               <a:rPr lang="pt-BR" smtClean="0"/>
-              <a:t>‹#›</a:t>
+              <a:t>‹nº›</a:t>
             </a:fld>
             <a:endParaRPr lang="pt-BR"/>
           </a:p>
@@ -5282,7 +5884,7 @@
           <a:p>
             <a:fld id="{358D75C1-F3B0-4D81-A190-EFDBB1D1AFEE}" type="datetimeFigureOut">
               <a:rPr lang="pt-BR" smtClean="0"/>
-              <a:t>03/08/2021</a:t>
+              <a:t>12/08/2021</a:t>
             </a:fld>
             <a:endParaRPr lang="pt-BR"/>
           </a:p>
@@ -5336,7 +5938,7 @@
           <a:p>
             <a:fld id="{F6DAF70D-9E8B-4ED6-9311-5F4D3EA89BB5}" type="slidenum">
               <a:rPr lang="pt-BR" smtClean="0"/>
-              <a:t>‹#›</a:t>
+              <a:t>‹nº›</a:t>
             </a:fld>
             <a:endParaRPr lang="pt-BR"/>
           </a:p>
@@ -5547,7 +6149,7 @@
           <a:p>
             <a:fld id="{358D75C1-F3B0-4D81-A190-EFDBB1D1AFEE}" type="datetimeFigureOut">
               <a:rPr lang="pt-BR" smtClean="0"/>
-              <a:t>03/08/2021</a:t>
+              <a:t>12/08/2021</a:t>
             </a:fld>
             <a:endParaRPr lang="pt-BR"/>
           </a:p>
@@ -5601,7 +6203,7 @@
           <a:p>
             <a:fld id="{F6DAF70D-9E8B-4ED6-9311-5F4D3EA89BB5}" type="slidenum">
               <a:rPr lang="pt-BR" smtClean="0"/>
-              <a:t>‹#›</a:t>
+              <a:t>‹nº›</a:t>
             </a:fld>
             <a:endParaRPr lang="pt-BR"/>
           </a:p>
@@ -5959,7 +6561,7 @@
           <a:p>
             <a:fld id="{358D75C1-F3B0-4D81-A190-EFDBB1D1AFEE}" type="datetimeFigureOut">
               <a:rPr lang="pt-BR" smtClean="0"/>
-              <a:t>03/08/2021</a:t>
+              <a:t>12/08/2021</a:t>
             </a:fld>
             <a:endParaRPr lang="pt-BR"/>
           </a:p>
@@ -6013,7 +6615,7 @@
           <a:p>
             <a:fld id="{F6DAF70D-9E8B-4ED6-9311-5F4D3EA89BB5}" type="slidenum">
               <a:rPr lang="pt-BR" smtClean="0"/>
-              <a:t>‹#›</a:t>
+              <a:t>‹nº›</a:t>
             </a:fld>
             <a:endParaRPr lang="pt-BR"/>
           </a:p>
@@ -6100,7 +6702,7 @@
           <a:p>
             <a:fld id="{358D75C1-F3B0-4D81-A190-EFDBB1D1AFEE}" type="datetimeFigureOut">
               <a:rPr lang="pt-BR" smtClean="0"/>
-              <a:t>03/08/2021</a:t>
+              <a:t>12/08/2021</a:t>
             </a:fld>
             <a:endParaRPr lang="pt-BR"/>
           </a:p>
@@ -6154,7 +6756,7 @@
           <a:p>
             <a:fld id="{F6DAF70D-9E8B-4ED6-9311-5F4D3EA89BB5}" type="slidenum">
               <a:rPr lang="pt-BR" smtClean="0"/>
-              <a:t>‹#›</a:t>
+              <a:t>‹nº›</a:t>
             </a:fld>
             <a:endParaRPr lang="pt-BR"/>
           </a:p>
@@ -6213,7 +6815,7 @@
           <a:p>
             <a:fld id="{358D75C1-F3B0-4D81-A190-EFDBB1D1AFEE}" type="datetimeFigureOut">
               <a:rPr lang="pt-BR" smtClean="0"/>
-              <a:t>03/08/2021</a:t>
+              <a:t>12/08/2021</a:t>
             </a:fld>
             <a:endParaRPr lang="pt-BR"/>
           </a:p>
@@ -6267,7 +6869,7 @@
           <a:p>
             <a:fld id="{F6DAF70D-9E8B-4ED6-9311-5F4D3EA89BB5}" type="slidenum">
               <a:rPr lang="pt-BR" smtClean="0"/>
-              <a:t>‹#›</a:t>
+              <a:t>‹nº›</a:t>
             </a:fld>
             <a:endParaRPr lang="pt-BR"/>
           </a:p>
@@ -6524,7 +7126,7 @@
           <a:p>
             <a:fld id="{358D75C1-F3B0-4D81-A190-EFDBB1D1AFEE}" type="datetimeFigureOut">
               <a:rPr lang="pt-BR" smtClean="0"/>
-              <a:t>03/08/2021</a:t>
+              <a:t>12/08/2021</a:t>
             </a:fld>
             <a:endParaRPr lang="pt-BR"/>
           </a:p>
@@ -6578,7 +7180,7 @@
           <a:p>
             <a:fld id="{F6DAF70D-9E8B-4ED6-9311-5F4D3EA89BB5}" type="slidenum">
               <a:rPr lang="pt-BR" smtClean="0"/>
-              <a:t>‹#›</a:t>
+              <a:t>‹nº›</a:t>
             </a:fld>
             <a:endParaRPr lang="pt-BR"/>
           </a:p>
@@ -6812,7 +7414,7 @@
           <a:p>
             <a:fld id="{358D75C1-F3B0-4D81-A190-EFDBB1D1AFEE}" type="datetimeFigureOut">
               <a:rPr lang="pt-BR" smtClean="0"/>
-              <a:t>03/08/2021</a:t>
+              <a:t>12/08/2021</a:t>
             </a:fld>
             <a:endParaRPr lang="pt-BR"/>
           </a:p>
@@ -6866,7 +7468,7 @@
           <a:p>
             <a:fld id="{F6DAF70D-9E8B-4ED6-9311-5F4D3EA89BB5}" type="slidenum">
               <a:rPr lang="pt-BR" smtClean="0"/>
-              <a:t>‹#›</a:t>
+              <a:t>‹nº›</a:t>
             </a:fld>
             <a:endParaRPr lang="pt-BR"/>
           </a:p>
@@ -7053,7 +7655,7 @@
           <a:p>
             <a:fld id="{358D75C1-F3B0-4D81-A190-EFDBB1D1AFEE}" type="datetimeFigureOut">
               <a:rPr lang="pt-BR" smtClean="0"/>
-              <a:t>03/08/2021</a:t>
+              <a:t>12/08/2021</a:t>
             </a:fld>
             <a:endParaRPr lang="pt-BR"/>
           </a:p>
@@ -7143,7 +7745,7 @@
           <a:p>
             <a:fld id="{F6DAF70D-9E8B-4ED6-9311-5F4D3EA89BB5}" type="slidenum">
               <a:rPr lang="pt-BR" smtClean="0"/>
-              <a:t>‹#›</a:t>
+              <a:t>‹nº›</a:t>
             </a:fld>
             <a:endParaRPr lang="pt-BR"/>
           </a:p>
@@ -8645,6 +9247,3240 @@
           </p:nvPr>
         </p:nvPicPr>
         <p:blipFill>
+          <a:blip r:embed="rId3">
+            <a:extLst>
+              <a:ext uri="{28A0092B-C50C-407E-A947-70E740481C1C}">
+                <a14:useLocalDpi xmlns:a14="http://schemas.microsoft.com/office/drawing/2010/main" val="0"/>
+              </a:ext>
+            </a:extLst>
+          </a:blip>
+          <a:stretch>
+            <a:fillRect/>
+          </a:stretch>
+        </p:blipFill>
+        <p:spPr>
+          <a:xfrm>
+            <a:off x="-11088" y="1"/>
+            <a:ext cx="12203088" cy="6881654"/>
+          </a:xfrm>
+        </p:spPr>
+      </p:pic>
+      <p:pic>
+        <p:nvPicPr>
+          <p:cNvPr id="9" name="Gráfico 8">
+            <a:extLst>
+              <a:ext uri="{FF2B5EF4-FFF2-40B4-BE49-F238E27FC236}">
+                <a16:creationId xmlns:a16="http://schemas.microsoft.com/office/drawing/2014/main" id="{8951ED2D-02AB-4784-A820-1B65DE4713F5}"/>
+              </a:ext>
+            </a:extLst>
+          </p:cNvPr>
+          <p:cNvPicPr>
+            <a:picLocks noChangeAspect="1"/>
+          </p:cNvPicPr>
+          <p:nvPr/>
+        </p:nvPicPr>
+        <p:blipFill>
+          <a:blip r:embed="rId4">
+            <a:extLst>
+              <a:ext uri="{96DAC541-7B7A-43D3-8B79-37D633B846F1}">
+                <asvg:svgBlip xmlns:asvg="http://schemas.microsoft.com/office/drawing/2016/SVG/main" r:embed="rId5"/>
+              </a:ext>
+            </a:extLst>
+          </a:blip>
+          <a:stretch>
+            <a:fillRect/>
+          </a:stretch>
+        </p:blipFill>
+        <p:spPr>
+          <a:xfrm>
+            <a:off x="5497357" y="2473134"/>
+            <a:ext cx="185616" cy="219365"/>
+          </a:xfrm>
+          <a:prstGeom prst="rect">
+            <a:avLst/>
+          </a:prstGeom>
+        </p:spPr>
+      </p:pic>
+      <p:pic>
+        <p:nvPicPr>
+          <p:cNvPr id="10" name="Gráfico 9">
+            <a:extLst>
+              <a:ext uri="{FF2B5EF4-FFF2-40B4-BE49-F238E27FC236}">
+                <a16:creationId xmlns:a16="http://schemas.microsoft.com/office/drawing/2014/main" id="{FDE0F12D-8D89-4BEF-85B4-ADA531FBBE17}"/>
+              </a:ext>
+            </a:extLst>
+          </p:cNvPr>
+          <p:cNvPicPr>
+            <a:picLocks noChangeAspect="1"/>
+          </p:cNvPicPr>
+          <p:nvPr/>
+        </p:nvPicPr>
+        <p:blipFill>
+          <a:blip r:embed="rId4">
+            <a:extLst>
+              <a:ext uri="{96DAC541-7B7A-43D3-8B79-37D633B846F1}">
+                <asvg:svgBlip xmlns:asvg="http://schemas.microsoft.com/office/drawing/2016/SVG/main" r:embed="rId5"/>
+              </a:ext>
+            </a:extLst>
+          </a:blip>
+          <a:stretch>
+            <a:fillRect/>
+          </a:stretch>
+        </p:blipFill>
+        <p:spPr>
+          <a:xfrm>
+            <a:off x="6565133" y="3554365"/>
+            <a:ext cx="107465" cy="127002"/>
+          </a:xfrm>
+          <a:prstGeom prst="rect">
+            <a:avLst/>
+          </a:prstGeom>
+        </p:spPr>
+      </p:pic>
+      <p:sp>
+        <p:nvSpPr>
+          <p:cNvPr id="6" name="Título 1">
+            <a:extLst>
+              <a:ext uri="{FF2B5EF4-FFF2-40B4-BE49-F238E27FC236}">
+                <a16:creationId xmlns:a16="http://schemas.microsoft.com/office/drawing/2014/main" id="{EC993F68-2ABC-472C-9DAA-F49885B6553A}"/>
+              </a:ext>
+            </a:extLst>
+          </p:cNvPr>
+          <p:cNvSpPr>
+            <a:spLocks noGrp="1"/>
+          </p:cNvSpPr>
+          <p:nvPr>
+            <p:ph type="title"/>
+          </p:nvPr>
+        </p:nvSpPr>
+        <p:spPr>
+          <a:xfrm>
+            <a:off x="29290" y="2418011"/>
+            <a:ext cx="12162710" cy="2021978"/>
+          </a:xfrm>
+        </p:spPr>
+        <p:txBody>
+          <a:bodyPr>
+            <a:normAutofit/>
+          </a:bodyPr>
+          <a:lstStyle/>
+          <a:p>
+            <a:pPr algn="ctr"/>
+            <a:r>
+              <a:rPr lang="pt-BR" sz="3600" dirty="0">
+                <a:solidFill>
+                  <a:schemeClr val="bg1"/>
+                </a:solidFill>
+                <a:latin typeface="Nunito Light" pitchFamily="2" charset="0"/>
+              </a:rPr>
+              <a:t>DEMO</a:t>
+            </a:r>
+            <a:br>
+              <a:rPr lang="pt-BR" sz="6000" dirty="0">
+                <a:solidFill>
+                  <a:schemeClr val="bg1"/>
+                </a:solidFill>
+                <a:latin typeface="Nunito" pitchFamily="2" charset="77"/>
+              </a:rPr>
+            </a:br>
+            <a:r>
+              <a:rPr lang="pt-BR" sz="6000" dirty="0">
+                <a:solidFill>
+                  <a:schemeClr val="bg1"/>
+                </a:solidFill>
+                <a:latin typeface="Nunito" pitchFamily="2" charset="77"/>
+              </a:rPr>
+              <a:t>Preparando o ambiente</a:t>
+            </a:r>
+            <a:endParaRPr lang="pt-BR" sz="4000" dirty="0">
+              <a:solidFill>
+                <a:schemeClr val="bg1"/>
+              </a:solidFill>
+              <a:latin typeface="Nunito" pitchFamily="2" charset="77"/>
+            </a:endParaRPr>
+          </a:p>
+        </p:txBody>
+      </p:sp>
+    </p:spTree>
+    <p:extLst>
+      <p:ext uri="{BB962C8B-B14F-4D97-AF65-F5344CB8AC3E}">
+        <p14:creationId xmlns:p14="http://schemas.microsoft.com/office/powerpoint/2010/main" val="3429438699"/>
+      </p:ext>
+    </p:extLst>
+  </p:cSld>
+  <p:clrMapOvr>
+    <a:masterClrMapping/>
+  </p:clrMapOvr>
+  <mc:AlternateContent xmlns:mc="http://schemas.openxmlformats.org/markup-compatibility/2006" xmlns:p14="http://schemas.microsoft.com/office/powerpoint/2010/main">
+    <mc:Choice Requires="p14">
+      <p:transition spd="med" p14:dur="700">
+        <p:fade/>
+      </p:transition>
+    </mc:Choice>
+    <mc:Fallback xmlns="">
+      <p:transition spd="med">
+        <p:fade/>
+      </p:transition>
+    </mc:Fallback>
+  </mc:AlternateContent>
+  <p:timing>
+    <p:tnLst>
+      <p:par>
+        <p:cTn id="1" dur="indefinite" restart="never" nodeType="tmRoot">
+          <p:childTnLst>
+            <p:seq concurrent="1" nextAc="seek">
+              <p:cTn id="2" dur="indefinite" nodeType="mainSeq">
+                <p:childTnLst>
+                  <p:par>
+                    <p:cTn id="3" fill="hold">
+                      <p:stCondLst>
+                        <p:cond delay="indefinite"/>
+                        <p:cond evt="onBegin" delay="0">
+                          <p:tn val="2"/>
+                        </p:cond>
+                      </p:stCondLst>
+                      <p:childTnLst>
+                        <p:par>
+                          <p:cTn id="4" fill="hold">
+                            <p:stCondLst>
+                              <p:cond delay="0"/>
+                            </p:stCondLst>
+                            <p:childTnLst>
+                              <p:par>
+                                <p:cTn id="5" presetID="10" presetClass="entr" presetSubtype="0" fill="hold" grpId="0" nodeType="afterEffect">
+                                  <p:stCondLst>
+                                    <p:cond delay="0"/>
+                                  </p:stCondLst>
+                                  <p:childTnLst>
+                                    <p:set>
+                                      <p:cBhvr>
+                                        <p:cTn id="6" dur="1" fill="hold">
+                                          <p:stCondLst>
+                                            <p:cond delay="0"/>
+                                          </p:stCondLst>
+                                        </p:cTn>
+                                        <p:tgtEl>
+                                          <p:spTgt spid="6"/>
+                                        </p:tgtEl>
+                                        <p:attrNameLst>
+                                          <p:attrName>style.visibility</p:attrName>
+                                        </p:attrNameLst>
+                                      </p:cBhvr>
+                                      <p:to>
+                                        <p:strVal val="visible"/>
+                                      </p:to>
+                                    </p:set>
+                                    <p:animEffect transition="in" filter="fade">
+                                      <p:cBhvr>
+                                        <p:cTn id="7" dur="500"/>
+                                        <p:tgtEl>
+                                          <p:spTgt spid="6"/>
+                                        </p:tgtEl>
+                                      </p:cBhvr>
+                                    </p:animEffect>
+                                  </p:childTnLst>
+                                </p:cTn>
+                              </p:par>
+                              <p:par>
+                                <p:cTn id="8" presetID="10" presetClass="entr" presetSubtype="0" fill="hold" nodeType="withEffect">
+                                  <p:stCondLst>
+                                    <p:cond delay="0"/>
+                                  </p:stCondLst>
+                                  <p:childTnLst>
+                                    <p:set>
+                                      <p:cBhvr>
+                                        <p:cTn id="9" dur="1" fill="hold">
+                                          <p:stCondLst>
+                                            <p:cond delay="0"/>
+                                          </p:stCondLst>
+                                        </p:cTn>
+                                        <p:tgtEl>
+                                          <p:spTgt spid="9"/>
+                                        </p:tgtEl>
+                                        <p:attrNameLst>
+                                          <p:attrName>style.visibility</p:attrName>
+                                        </p:attrNameLst>
+                                      </p:cBhvr>
+                                      <p:to>
+                                        <p:strVal val="visible"/>
+                                      </p:to>
+                                    </p:set>
+                                    <p:animEffect transition="in" filter="fade">
+                                      <p:cBhvr>
+                                        <p:cTn id="10" dur="500"/>
+                                        <p:tgtEl>
+                                          <p:spTgt spid="9"/>
+                                        </p:tgtEl>
+                                      </p:cBhvr>
+                                    </p:animEffect>
+                                  </p:childTnLst>
+                                </p:cTn>
+                              </p:par>
+                              <p:par>
+                                <p:cTn id="11" presetID="51" presetClass="path" presetSubtype="0" repeatCount="indefinite" accel="50000" decel="50000" autoRev="1" fill="hold" nodeType="withEffect">
+                                  <p:stCondLst>
+                                    <p:cond delay="0"/>
+                                  </p:stCondLst>
+                                  <p:childTnLst>
+                                    <p:animMotion origin="layout" path="M -3.54167E-6 -3.7037E-7 L -0.03997 0.0669 C -0.04895 0.08102 -0.05403 0.10208 -0.05403 0.12407 C -0.05403 0.14907 -0.04895 0.16898 -0.03997 0.1831 L -3.54167E-6 0.25 " pathEditMode="relative" rAng="0" ptsTypes="AAAAA">
+                                      <p:cBhvr>
+                                        <p:cTn id="12" dur="2000" fill="hold"/>
+                                        <p:tgtEl>
+                                          <p:spTgt spid="9"/>
+                                        </p:tgtEl>
+                                        <p:attrNameLst>
+                                          <p:attrName>ppt_x</p:attrName>
+                                          <p:attrName>ppt_y</p:attrName>
+                                        </p:attrNameLst>
+                                      </p:cBhvr>
+                                      <p:rCtr x="-2708" y="12500"/>
+                                    </p:animMotion>
+                                  </p:childTnLst>
+                                </p:cTn>
+                              </p:par>
+                              <p:par>
+                                <p:cTn id="13" presetID="10" presetClass="entr" presetSubtype="0" fill="hold" nodeType="withEffect">
+                                  <p:stCondLst>
+                                    <p:cond delay="0"/>
+                                  </p:stCondLst>
+                                  <p:childTnLst>
+                                    <p:set>
+                                      <p:cBhvr>
+                                        <p:cTn id="14" dur="1" fill="hold">
+                                          <p:stCondLst>
+                                            <p:cond delay="0"/>
+                                          </p:stCondLst>
+                                        </p:cTn>
+                                        <p:tgtEl>
+                                          <p:spTgt spid="10"/>
+                                        </p:tgtEl>
+                                        <p:attrNameLst>
+                                          <p:attrName>style.visibility</p:attrName>
+                                        </p:attrNameLst>
+                                      </p:cBhvr>
+                                      <p:to>
+                                        <p:strVal val="visible"/>
+                                      </p:to>
+                                    </p:set>
+                                    <p:animEffect transition="in" filter="fade">
+                                      <p:cBhvr>
+                                        <p:cTn id="15" dur="500"/>
+                                        <p:tgtEl>
+                                          <p:spTgt spid="10"/>
+                                        </p:tgtEl>
+                                      </p:cBhvr>
+                                    </p:animEffect>
+                                  </p:childTnLst>
+                                </p:cTn>
+                              </p:par>
+                              <p:par>
+                                <p:cTn id="16" presetID="1" presetClass="path" presetSubtype="0" repeatCount="indefinite" accel="50000" decel="50000" autoRev="1" fill="hold" nodeType="withEffect">
+                                  <p:stCondLst>
+                                    <p:cond delay="0"/>
+                                  </p:stCondLst>
+                                  <p:childTnLst>
+                                    <p:animMotion origin="layout" path="M -0.04909 -0.08658 C -0.00925 -0.08658 0.02305 -0.03056 0.02305 0.03842 C 0.02305 0.1074 -0.00925 0.16342 -0.04909 0.16342 C -0.08893 0.16342 -0.1211 0.1074 -0.1211 0.03842 C -0.1211 -0.03056 -0.08893 -0.08658 -0.04909 -0.08658 Z " pathEditMode="relative" rAng="0" ptsTypes="AAAAA">
+                                      <p:cBhvr>
+                                        <p:cTn id="17" dur="4000" fill="hold"/>
+                                        <p:tgtEl>
+                                          <p:spTgt spid="10"/>
+                                        </p:tgtEl>
+                                        <p:attrNameLst>
+                                          <p:attrName>ppt_x</p:attrName>
+                                          <p:attrName>ppt_y</p:attrName>
+                                        </p:attrNameLst>
+                                      </p:cBhvr>
+                                      <p:rCtr x="0" y="12500"/>
+                                    </p:animMotion>
+                                  </p:childTnLst>
+                                </p:cTn>
+                              </p:par>
+                            </p:childTnLst>
+                          </p:cTn>
+                        </p:par>
+                      </p:childTnLst>
+                    </p:cTn>
+                  </p:par>
+                </p:childTnLst>
+              </p:cTn>
+              <p:prevCondLst>
+                <p:cond evt="onPrev" delay="0">
+                  <p:tgtEl>
+                    <p:sldTgt/>
+                  </p:tgtEl>
+                </p:cond>
+              </p:prevCondLst>
+              <p:nextCondLst>
+                <p:cond evt="onNext" delay="0">
+                  <p:tgtEl>
+                    <p:sldTgt/>
+                  </p:tgtEl>
+                </p:cond>
+              </p:nextCondLst>
+            </p:seq>
+          </p:childTnLst>
+        </p:cTn>
+      </p:par>
+    </p:tnLst>
+    <p:bldLst>
+      <p:bldP spid="6" grpId="0"/>
+    </p:bldLst>
+  </p:timing>
+</p:sld>
+</file>
+
+<file path=ppt/slides/slide12.xml><?xml version="1.0" encoding="utf-8"?>
+<p:sld xmlns:a="http://schemas.openxmlformats.org/drawingml/2006/main" xmlns:r="http://schemas.openxmlformats.org/officeDocument/2006/relationships" xmlns:p="http://schemas.openxmlformats.org/presentationml/2006/main">
+  <p:cSld>
+    <p:spTree>
+      <p:nvGrpSpPr>
+        <p:cNvPr id="1" name=""/>
+        <p:cNvGrpSpPr/>
+        <p:nvPr/>
+      </p:nvGrpSpPr>
+      <p:grpSpPr>
+        <a:xfrm>
+          <a:off x="0" y="0"/>
+          <a:ext cx="0" cy="0"/>
+          <a:chOff x="0" y="0"/>
+          <a:chExt cx="0" cy="0"/>
+        </a:xfrm>
+      </p:grpSpPr>
+      <p:pic>
+        <p:nvPicPr>
+          <p:cNvPr id="5" name="Espaço Reservado para Conteúdo 4">
+            <a:extLst>
+              <a:ext uri="{FF2B5EF4-FFF2-40B4-BE49-F238E27FC236}">
+                <a16:creationId xmlns:a16="http://schemas.microsoft.com/office/drawing/2014/main" id="{DEBCF998-65B9-41B2-A535-E5741DD64BE5}"/>
+              </a:ext>
+            </a:extLst>
+          </p:cNvPr>
+          <p:cNvPicPr>
+            <a:picLocks noGrp="1" noChangeAspect="1"/>
+          </p:cNvPicPr>
+          <p:nvPr>
+            <p:ph idx="1"/>
+          </p:nvPr>
+        </p:nvPicPr>
+        <p:blipFill>
+          <a:blip r:embed="rId3">
+            <a:extLst>
+              <a:ext uri="{28A0092B-C50C-407E-A947-70E740481C1C}">
+                <a14:useLocalDpi xmlns:a14="http://schemas.microsoft.com/office/drawing/2010/main" val="0"/>
+              </a:ext>
+            </a:extLst>
+          </a:blip>
+          <a:stretch>
+            <a:fillRect/>
+          </a:stretch>
+        </p:blipFill>
+        <p:spPr>
+          <a:xfrm>
+            <a:off x="-11088" y="1"/>
+            <a:ext cx="12203088" cy="6881654"/>
+          </a:xfrm>
+        </p:spPr>
+      </p:pic>
+      <p:pic>
+        <p:nvPicPr>
+          <p:cNvPr id="9" name="Gráfico 8">
+            <a:extLst>
+              <a:ext uri="{FF2B5EF4-FFF2-40B4-BE49-F238E27FC236}">
+                <a16:creationId xmlns:a16="http://schemas.microsoft.com/office/drawing/2014/main" id="{8951ED2D-02AB-4784-A820-1B65DE4713F5}"/>
+              </a:ext>
+            </a:extLst>
+          </p:cNvPr>
+          <p:cNvPicPr>
+            <a:picLocks noChangeAspect="1"/>
+          </p:cNvPicPr>
+          <p:nvPr/>
+        </p:nvPicPr>
+        <p:blipFill>
+          <a:blip r:embed="rId4">
+            <a:extLst>
+              <a:ext uri="{96DAC541-7B7A-43D3-8B79-37D633B846F1}">
+                <asvg:svgBlip xmlns:asvg="http://schemas.microsoft.com/office/drawing/2016/SVG/main" r:embed="rId5"/>
+              </a:ext>
+            </a:extLst>
+          </a:blip>
+          <a:stretch>
+            <a:fillRect/>
+          </a:stretch>
+        </p:blipFill>
+        <p:spPr>
+          <a:xfrm>
+            <a:off x="5497357" y="2473134"/>
+            <a:ext cx="185616" cy="219365"/>
+          </a:xfrm>
+          <a:prstGeom prst="rect">
+            <a:avLst/>
+          </a:prstGeom>
+        </p:spPr>
+      </p:pic>
+      <p:pic>
+        <p:nvPicPr>
+          <p:cNvPr id="10" name="Gráfico 9">
+            <a:extLst>
+              <a:ext uri="{FF2B5EF4-FFF2-40B4-BE49-F238E27FC236}">
+                <a16:creationId xmlns:a16="http://schemas.microsoft.com/office/drawing/2014/main" id="{FDE0F12D-8D89-4BEF-85B4-ADA531FBBE17}"/>
+              </a:ext>
+            </a:extLst>
+          </p:cNvPr>
+          <p:cNvPicPr>
+            <a:picLocks noChangeAspect="1"/>
+          </p:cNvPicPr>
+          <p:nvPr/>
+        </p:nvPicPr>
+        <p:blipFill>
+          <a:blip r:embed="rId4">
+            <a:extLst>
+              <a:ext uri="{96DAC541-7B7A-43D3-8B79-37D633B846F1}">
+                <asvg:svgBlip xmlns:asvg="http://schemas.microsoft.com/office/drawing/2016/SVG/main" r:embed="rId5"/>
+              </a:ext>
+            </a:extLst>
+          </a:blip>
+          <a:stretch>
+            <a:fillRect/>
+          </a:stretch>
+        </p:blipFill>
+        <p:spPr>
+          <a:xfrm>
+            <a:off x="6565133" y="3554365"/>
+            <a:ext cx="107465" cy="127002"/>
+          </a:xfrm>
+          <a:prstGeom prst="rect">
+            <a:avLst/>
+          </a:prstGeom>
+        </p:spPr>
+      </p:pic>
+      <p:sp>
+        <p:nvSpPr>
+          <p:cNvPr id="6" name="Título 1">
+            <a:extLst>
+              <a:ext uri="{FF2B5EF4-FFF2-40B4-BE49-F238E27FC236}">
+                <a16:creationId xmlns:a16="http://schemas.microsoft.com/office/drawing/2014/main" id="{EC993F68-2ABC-472C-9DAA-F49885B6553A}"/>
+              </a:ext>
+            </a:extLst>
+          </p:cNvPr>
+          <p:cNvSpPr>
+            <a:spLocks noGrp="1"/>
+          </p:cNvSpPr>
+          <p:nvPr>
+            <p:ph type="title"/>
+          </p:nvPr>
+        </p:nvSpPr>
+        <p:spPr>
+          <a:xfrm>
+            <a:off x="29290" y="2418011"/>
+            <a:ext cx="12162710" cy="2021978"/>
+          </a:xfrm>
+        </p:spPr>
+        <p:txBody>
+          <a:bodyPr>
+            <a:normAutofit/>
+          </a:bodyPr>
+          <a:lstStyle/>
+          <a:p>
+            <a:pPr algn="ctr"/>
+            <a:r>
+              <a:rPr lang="pt-BR" sz="4000" dirty="0">
+                <a:solidFill>
+                  <a:schemeClr val="bg1"/>
+                </a:solidFill>
+                <a:latin typeface="Nunito Light" pitchFamily="2" charset="0"/>
+              </a:rPr>
+              <a:t>DEMO</a:t>
+            </a:r>
+            <a:br>
+              <a:rPr lang="pt-BR" sz="6000" dirty="0">
+                <a:solidFill>
+                  <a:schemeClr val="bg1"/>
+                </a:solidFill>
+                <a:latin typeface="Nunito" pitchFamily="2" charset="77"/>
+              </a:rPr>
+            </a:br>
+            <a:r>
+              <a:rPr lang="pt-BR" sz="6000" dirty="0">
+                <a:solidFill>
+                  <a:schemeClr val="bg1"/>
+                </a:solidFill>
+                <a:latin typeface="Nunito" pitchFamily="2" charset="77"/>
+              </a:rPr>
+              <a:t>Criando as entidades</a:t>
+            </a:r>
+            <a:endParaRPr lang="pt-BR" sz="4000" dirty="0">
+              <a:solidFill>
+                <a:schemeClr val="bg1"/>
+              </a:solidFill>
+              <a:latin typeface="Nunito" pitchFamily="2" charset="77"/>
+            </a:endParaRPr>
+          </a:p>
+        </p:txBody>
+      </p:sp>
+    </p:spTree>
+    <p:extLst>
+      <p:ext uri="{BB962C8B-B14F-4D97-AF65-F5344CB8AC3E}">
+        <p14:creationId xmlns:p14="http://schemas.microsoft.com/office/powerpoint/2010/main" val="2456892617"/>
+      </p:ext>
+    </p:extLst>
+  </p:cSld>
+  <p:clrMapOvr>
+    <a:masterClrMapping/>
+  </p:clrMapOvr>
+  <mc:AlternateContent xmlns:mc="http://schemas.openxmlformats.org/markup-compatibility/2006" xmlns:p14="http://schemas.microsoft.com/office/powerpoint/2010/main">
+    <mc:Choice Requires="p14">
+      <p:transition spd="med" p14:dur="700">
+        <p:fade/>
+      </p:transition>
+    </mc:Choice>
+    <mc:Fallback xmlns="">
+      <p:transition spd="med">
+        <p:fade/>
+      </p:transition>
+    </mc:Fallback>
+  </mc:AlternateContent>
+  <p:timing>
+    <p:tnLst>
+      <p:par>
+        <p:cTn id="1" dur="indefinite" restart="never" nodeType="tmRoot">
+          <p:childTnLst>
+            <p:seq concurrent="1" nextAc="seek">
+              <p:cTn id="2" dur="indefinite" nodeType="mainSeq">
+                <p:childTnLst>
+                  <p:par>
+                    <p:cTn id="3" fill="hold">
+                      <p:stCondLst>
+                        <p:cond delay="indefinite"/>
+                        <p:cond evt="onBegin" delay="0">
+                          <p:tn val="2"/>
+                        </p:cond>
+                      </p:stCondLst>
+                      <p:childTnLst>
+                        <p:par>
+                          <p:cTn id="4" fill="hold">
+                            <p:stCondLst>
+                              <p:cond delay="0"/>
+                            </p:stCondLst>
+                            <p:childTnLst>
+                              <p:par>
+                                <p:cTn id="5" presetID="10" presetClass="entr" presetSubtype="0" fill="hold" grpId="0" nodeType="afterEffect">
+                                  <p:stCondLst>
+                                    <p:cond delay="0"/>
+                                  </p:stCondLst>
+                                  <p:childTnLst>
+                                    <p:set>
+                                      <p:cBhvr>
+                                        <p:cTn id="6" dur="1" fill="hold">
+                                          <p:stCondLst>
+                                            <p:cond delay="0"/>
+                                          </p:stCondLst>
+                                        </p:cTn>
+                                        <p:tgtEl>
+                                          <p:spTgt spid="6"/>
+                                        </p:tgtEl>
+                                        <p:attrNameLst>
+                                          <p:attrName>style.visibility</p:attrName>
+                                        </p:attrNameLst>
+                                      </p:cBhvr>
+                                      <p:to>
+                                        <p:strVal val="visible"/>
+                                      </p:to>
+                                    </p:set>
+                                    <p:animEffect transition="in" filter="fade">
+                                      <p:cBhvr>
+                                        <p:cTn id="7" dur="500"/>
+                                        <p:tgtEl>
+                                          <p:spTgt spid="6"/>
+                                        </p:tgtEl>
+                                      </p:cBhvr>
+                                    </p:animEffect>
+                                  </p:childTnLst>
+                                </p:cTn>
+                              </p:par>
+                              <p:par>
+                                <p:cTn id="8" presetID="10" presetClass="entr" presetSubtype="0" fill="hold" nodeType="withEffect">
+                                  <p:stCondLst>
+                                    <p:cond delay="0"/>
+                                  </p:stCondLst>
+                                  <p:childTnLst>
+                                    <p:set>
+                                      <p:cBhvr>
+                                        <p:cTn id="9" dur="1" fill="hold">
+                                          <p:stCondLst>
+                                            <p:cond delay="0"/>
+                                          </p:stCondLst>
+                                        </p:cTn>
+                                        <p:tgtEl>
+                                          <p:spTgt spid="9"/>
+                                        </p:tgtEl>
+                                        <p:attrNameLst>
+                                          <p:attrName>style.visibility</p:attrName>
+                                        </p:attrNameLst>
+                                      </p:cBhvr>
+                                      <p:to>
+                                        <p:strVal val="visible"/>
+                                      </p:to>
+                                    </p:set>
+                                    <p:animEffect transition="in" filter="fade">
+                                      <p:cBhvr>
+                                        <p:cTn id="10" dur="500"/>
+                                        <p:tgtEl>
+                                          <p:spTgt spid="9"/>
+                                        </p:tgtEl>
+                                      </p:cBhvr>
+                                    </p:animEffect>
+                                  </p:childTnLst>
+                                </p:cTn>
+                              </p:par>
+                              <p:par>
+                                <p:cTn id="11" presetID="51" presetClass="path" presetSubtype="0" repeatCount="indefinite" accel="50000" decel="50000" autoRev="1" fill="hold" nodeType="withEffect">
+                                  <p:stCondLst>
+                                    <p:cond delay="0"/>
+                                  </p:stCondLst>
+                                  <p:childTnLst>
+                                    <p:animMotion origin="layout" path="M -3.54167E-6 -3.7037E-7 L -0.03997 0.0669 C -0.04895 0.08102 -0.05403 0.10208 -0.05403 0.12407 C -0.05403 0.14907 -0.04895 0.16898 -0.03997 0.1831 L -3.54167E-6 0.25 " pathEditMode="relative" rAng="0" ptsTypes="AAAAA">
+                                      <p:cBhvr>
+                                        <p:cTn id="12" dur="2000" fill="hold"/>
+                                        <p:tgtEl>
+                                          <p:spTgt spid="9"/>
+                                        </p:tgtEl>
+                                        <p:attrNameLst>
+                                          <p:attrName>ppt_x</p:attrName>
+                                          <p:attrName>ppt_y</p:attrName>
+                                        </p:attrNameLst>
+                                      </p:cBhvr>
+                                      <p:rCtr x="-2708" y="12500"/>
+                                    </p:animMotion>
+                                  </p:childTnLst>
+                                </p:cTn>
+                              </p:par>
+                              <p:par>
+                                <p:cTn id="13" presetID="10" presetClass="entr" presetSubtype="0" fill="hold" nodeType="withEffect">
+                                  <p:stCondLst>
+                                    <p:cond delay="0"/>
+                                  </p:stCondLst>
+                                  <p:childTnLst>
+                                    <p:set>
+                                      <p:cBhvr>
+                                        <p:cTn id="14" dur="1" fill="hold">
+                                          <p:stCondLst>
+                                            <p:cond delay="0"/>
+                                          </p:stCondLst>
+                                        </p:cTn>
+                                        <p:tgtEl>
+                                          <p:spTgt spid="10"/>
+                                        </p:tgtEl>
+                                        <p:attrNameLst>
+                                          <p:attrName>style.visibility</p:attrName>
+                                        </p:attrNameLst>
+                                      </p:cBhvr>
+                                      <p:to>
+                                        <p:strVal val="visible"/>
+                                      </p:to>
+                                    </p:set>
+                                    <p:animEffect transition="in" filter="fade">
+                                      <p:cBhvr>
+                                        <p:cTn id="15" dur="500"/>
+                                        <p:tgtEl>
+                                          <p:spTgt spid="10"/>
+                                        </p:tgtEl>
+                                      </p:cBhvr>
+                                    </p:animEffect>
+                                  </p:childTnLst>
+                                </p:cTn>
+                              </p:par>
+                              <p:par>
+                                <p:cTn id="16" presetID="1" presetClass="path" presetSubtype="0" repeatCount="indefinite" accel="50000" decel="50000" autoRev="1" fill="hold" nodeType="withEffect">
+                                  <p:stCondLst>
+                                    <p:cond delay="0"/>
+                                  </p:stCondLst>
+                                  <p:childTnLst>
+                                    <p:animMotion origin="layout" path="M -0.04909 -0.08658 C -0.00925 -0.08658 0.02305 -0.03056 0.02305 0.03842 C 0.02305 0.1074 -0.00925 0.16342 -0.04909 0.16342 C -0.08893 0.16342 -0.1211 0.1074 -0.1211 0.03842 C -0.1211 -0.03056 -0.08893 -0.08658 -0.04909 -0.08658 Z " pathEditMode="relative" rAng="0" ptsTypes="AAAAA">
+                                      <p:cBhvr>
+                                        <p:cTn id="17" dur="4000" fill="hold"/>
+                                        <p:tgtEl>
+                                          <p:spTgt spid="10"/>
+                                        </p:tgtEl>
+                                        <p:attrNameLst>
+                                          <p:attrName>ppt_x</p:attrName>
+                                          <p:attrName>ppt_y</p:attrName>
+                                        </p:attrNameLst>
+                                      </p:cBhvr>
+                                      <p:rCtr x="0" y="12500"/>
+                                    </p:animMotion>
+                                  </p:childTnLst>
+                                </p:cTn>
+                              </p:par>
+                            </p:childTnLst>
+                          </p:cTn>
+                        </p:par>
+                      </p:childTnLst>
+                    </p:cTn>
+                  </p:par>
+                </p:childTnLst>
+              </p:cTn>
+              <p:prevCondLst>
+                <p:cond evt="onPrev" delay="0">
+                  <p:tgtEl>
+                    <p:sldTgt/>
+                  </p:tgtEl>
+                </p:cond>
+              </p:prevCondLst>
+              <p:nextCondLst>
+                <p:cond evt="onNext" delay="0">
+                  <p:tgtEl>
+                    <p:sldTgt/>
+                  </p:tgtEl>
+                </p:cond>
+              </p:nextCondLst>
+            </p:seq>
+          </p:childTnLst>
+        </p:cTn>
+      </p:par>
+    </p:tnLst>
+    <p:bldLst>
+      <p:bldP spid="6" grpId="0"/>
+    </p:bldLst>
+  </p:timing>
+</p:sld>
+</file>
+
+<file path=ppt/slides/slide13.xml><?xml version="1.0" encoding="utf-8"?>
+<p:sld xmlns:a="http://schemas.openxmlformats.org/drawingml/2006/main" xmlns:r="http://schemas.openxmlformats.org/officeDocument/2006/relationships" xmlns:p="http://schemas.openxmlformats.org/presentationml/2006/main">
+  <p:cSld>
+    <p:spTree>
+      <p:nvGrpSpPr>
+        <p:cNvPr id="1" name=""/>
+        <p:cNvGrpSpPr/>
+        <p:nvPr/>
+      </p:nvGrpSpPr>
+      <p:grpSpPr>
+        <a:xfrm>
+          <a:off x="0" y="0"/>
+          <a:ext cx="0" cy="0"/>
+          <a:chOff x="0" y="0"/>
+          <a:chExt cx="0" cy="0"/>
+        </a:xfrm>
+      </p:grpSpPr>
+      <p:pic>
+        <p:nvPicPr>
+          <p:cNvPr id="5" name="Espaço Reservado para Conteúdo 4">
+            <a:extLst>
+              <a:ext uri="{FF2B5EF4-FFF2-40B4-BE49-F238E27FC236}">
+                <a16:creationId xmlns:a16="http://schemas.microsoft.com/office/drawing/2014/main" id="{DEBCF998-65B9-41B2-A535-E5741DD64BE5}"/>
+              </a:ext>
+            </a:extLst>
+          </p:cNvPr>
+          <p:cNvPicPr>
+            <a:picLocks noGrp="1" noChangeAspect="1"/>
+          </p:cNvPicPr>
+          <p:nvPr>
+            <p:ph idx="1"/>
+          </p:nvPr>
+        </p:nvPicPr>
+        <p:blipFill>
+          <a:blip r:embed="rId3">
+            <a:extLst>
+              <a:ext uri="{28A0092B-C50C-407E-A947-70E740481C1C}">
+                <a14:useLocalDpi xmlns:a14="http://schemas.microsoft.com/office/drawing/2010/main" val="0"/>
+              </a:ext>
+            </a:extLst>
+          </a:blip>
+          <a:stretch>
+            <a:fillRect/>
+          </a:stretch>
+        </p:blipFill>
+        <p:spPr>
+          <a:xfrm>
+            <a:off x="-11088" y="1"/>
+            <a:ext cx="12203088" cy="6881654"/>
+          </a:xfrm>
+        </p:spPr>
+      </p:pic>
+      <p:pic>
+        <p:nvPicPr>
+          <p:cNvPr id="9" name="Gráfico 8">
+            <a:extLst>
+              <a:ext uri="{FF2B5EF4-FFF2-40B4-BE49-F238E27FC236}">
+                <a16:creationId xmlns:a16="http://schemas.microsoft.com/office/drawing/2014/main" id="{8951ED2D-02AB-4784-A820-1B65DE4713F5}"/>
+              </a:ext>
+            </a:extLst>
+          </p:cNvPr>
+          <p:cNvPicPr>
+            <a:picLocks noChangeAspect="1"/>
+          </p:cNvPicPr>
+          <p:nvPr/>
+        </p:nvPicPr>
+        <p:blipFill>
+          <a:blip r:embed="rId4">
+            <a:extLst>
+              <a:ext uri="{96DAC541-7B7A-43D3-8B79-37D633B846F1}">
+                <asvg:svgBlip xmlns:asvg="http://schemas.microsoft.com/office/drawing/2016/SVG/main" r:embed="rId5"/>
+              </a:ext>
+            </a:extLst>
+          </a:blip>
+          <a:stretch>
+            <a:fillRect/>
+          </a:stretch>
+        </p:blipFill>
+        <p:spPr>
+          <a:xfrm>
+            <a:off x="5497357" y="2473134"/>
+            <a:ext cx="185616" cy="219365"/>
+          </a:xfrm>
+          <a:prstGeom prst="rect">
+            <a:avLst/>
+          </a:prstGeom>
+        </p:spPr>
+      </p:pic>
+      <p:pic>
+        <p:nvPicPr>
+          <p:cNvPr id="10" name="Gráfico 9">
+            <a:extLst>
+              <a:ext uri="{FF2B5EF4-FFF2-40B4-BE49-F238E27FC236}">
+                <a16:creationId xmlns:a16="http://schemas.microsoft.com/office/drawing/2014/main" id="{FDE0F12D-8D89-4BEF-85B4-ADA531FBBE17}"/>
+              </a:ext>
+            </a:extLst>
+          </p:cNvPr>
+          <p:cNvPicPr>
+            <a:picLocks noChangeAspect="1"/>
+          </p:cNvPicPr>
+          <p:nvPr/>
+        </p:nvPicPr>
+        <p:blipFill>
+          <a:blip r:embed="rId4">
+            <a:extLst>
+              <a:ext uri="{96DAC541-7B7A-43D3-8B79-37D633B846F1}">
+                <asvg:svgBlip xmlns:asvg="http://schemas.microsoft.com/office/drawing/2016/SVG/main" r:embed="rId5"/>
+              </a:ext>
+            </a:extLst>
+          </a:blip>
+          <a:stretch>
+            <a:fillRect/>
+          </a:stretch>
+        </p:blipFill>
+        <p:spPr>
+          <a:xfrm>
+            <a:off x="6565133" y="3554365"/>
+            <a:ext cx="107465" cy="127002"/>
+          </a:xfrm>
+          <a:prstGeom prst="rect">
+            <a:avLst/>
+          </a:prstGeom>
+        </p:spPr>
+      </p:pic>
+      <p:sp>
+        <p:nvSpPr>
+          <p:cNvPr id="6" name="Título 1">
+            <a:extLst>
+              <a:ext uri="{FF2B5EF4-FFF2-40B4-BE49-F238E27FC236}">
+                <a16:creationId xmlns:a16="http://schemas.microsoft.com/office/drawing/2014/main" id="{EC993F68-2ABC-472C-9DAA-F49885B6553A}"/>
+              </a:ext>
+            </a:extLst>
+          </p:cNvPr>
+          <p:cNvSpPr>
+            <a:spLocks noGrp="1"/>
+          </p:cNvSpPr>
+          <p:nvPr>
+            <p:ph type="title"/>
+          </p:nvPr>
+        </p:nvSpPr>
+        <p:spPr>
+          <a:xfrm>
+            <a:off x="29290" y="2418011"/>
+            <a:ext cx="12162710" cy="2021978"/>
+          </a:xfrm>
+        </p:spPr>
+        <p:txBody>
+          <a:bodyPr>
+            <a:normAutofit/>
+          </a:bodyPr>
+          <a:lstStyle/>
+          <a:p>
+            <a:pPr algn="ctr"/>
+            <a:r>
+              <a:rPr lang="pt-BR" sz="3600" dirty="0">
+                <a:solidFill>
+                  <a:schemeClr val="bg1"/>
+                </a:solidFill>
+                <a:latin typeface="Nunito Light" pitchFamily="2" charset="0"/>
+              </a:rPr>
+              <a:t>DEMO</a:t>
+            </a:r>
+            <a:br>
+              <a:rPr lang="pt-BR" sz="6000" dirty="0">
+                <a:solidFill>
+                  <a:schemeClr val="bg1"/>
+                </a:solidFill>
+                <a:latin typeface="Nunito" pitchFamily="2" charset="77"/>
+              </a:rPr>
+            </a:br>
+            <a:r>
+              <a:rPr lang="pt-BR" sz="6000" dirty="0">
+                <a:solidFill>
+                  <a:schemeClr val="bg1"/>
+                </a:solidFill>
+                <a:latin typeface="Nunito" pitchFamily="2" charset="77"/>
+              </a:rPr>
+              <a:t>Criando o </a:t>
+            </a:r>
+            <a:r>
+              <a:rPr lang="pt-BR" sz="6000" dirty="0" err="1">
+                <a:solidFill>
+                  <a:schemeClr val="bg1"/>
+                </a:solidFill>
+                <a:latin typeface="Nunito" pitchFamily="2" charset="77"/>
+              </a:rPr>
+              <a:t>DataContext</a:t>
+            </a:r>
+            <a:endParaRPr lang="pt-BR" sz="4000" dirty="0">
+              <a:solidFill>
+                <a:schemeClr val="bg1"/>
+              </a:solidFill>
+              <a:latin typeface="Nunito" pitchFamily="2" charset="77"/>
+            </a:endParaRPr>
+          </a:p>
+        </p:txBody>
+      </p:sp>
+    </p:spTree>
+    <p:extLst>
+      <p:ext uri="{BB962C8B-B14F-4D97-AF65-F5344CB8AC3E}">
+        <p14:creationId xmlns:p14="http://schemas.microsoft.com/office/powerpoint/2010/main" val="1948464574"/>
+      </p:ext>
+    </p:extLst>
+  </p:cSld>
+  <p:clrMapOvr>
+    <a:masterClrMapping/>
+  </p:clrMapOvr>
+  <mc:AlternateContent xmlns:mc="http://schemas.openxmlformats.org/markup-compatibility/2006" xmlns:p14="http://schemas.microsoft.com/office/powerpoint/2010/main">
+    <mc:Choice Requires="p14">
+      <p:transition spd="med" p14:dur="700">
+        <p:fade/>
+      </p:transition>
+    </mc:Choice>
+    <mc:Fallback xmlns="">
+      <p:transition spd="med">
+        <p:fade/>
+      </p:transition>
+    </mc:Fallback>
+  </mc:AlternateContent>
+  <p:timing>
+    <p:tnLst>
+      <p:par>
+        <p:cTn id="1" dur="indefinite" restart="never" nodeType="tmRoot">
+          <p:childTnLst>
+            <p:seq concurrent="1" nextAc="seek">
+              <p:cTn id="2" dur="indefinite" nodeType="mainSeq">
+                <p:childTnLst>
+                  <p:par>
+                    <p:cTn id="3" fill="hold">
+                      <p:stCondLst>
+                        <p:cond delay="indefinite"/>
+                        <p:cond evt="onBegin" delay="0">
+                          <p:tn val="2"/>
+                        </p:cond>
+                      </p:stCondLst>
+                      <p:childTnLst>
+                        <p:par>
+                          <p:cTn id="4" fill="hold">
+                            <p:stCondLst>
+                              <p:cond delay="0"/>
+                            </p:stCondLst>
+                            <p:childTnLst>
+                              <p:par>
+                                <p:cTn id="5" presetID="10" presetClass="entr" presetSubtype="0" fill="hold" grpId="0" nodeType="afterEffect">
+                                  <p:stCondLst>
+                                    <p:cond delay="0"/>
+                                  </p:stCondLst>
+                                  <p:childTnLst>
+                                    <p:set>
+                                      <p:cBhvr>
+                                        <p:cTn id="6" dur="1" fill="hold">
+                                          <p:stCondLst>
+                                            <p:cond delay="0"/>
+                                          </p:stCondLst>
+                                        </p:cTn>
+                                        <p:tgtEl>
+                                          <p:spTgt spid="6"/>
+                                        </p:tgtEl>
+                                        <p:attrNameLst>
+                                          <p:attrName>style.visibility</p:attrName>
+                                        </p:attrNameLst>
+                                      </p:cBhvr>
+                                      <p:to>
+                                        <p:strVal val="visible"/>
+                                      </p:to>
+                                    </p:set>
+                                    <p:animEffect transition="in" filter="fade">
+                                      <p:cBhvr>
+                                        <p:cTn id="7" dur="500"/>
+                                        <p:tgtEl>
+                                          <p:spTgt spid="6"/>
+                                        </p:tgtEl>
+                                      </p:cBhvr>
+                                    </p:animEffect>
+                                  </p:childTnLst>
+                                </p:cTn>
+                              </p:par>
+                              <p:par>
+                                <p:cTn id="8" presetID="10" presetClass="entr" presetSubtype="0" fill="hold" nodeType="withEffect">
+                                  <p:stCondLst>
+                                    <p:cond delay="0"/>
+                                  </p:stCondLst>
+                                  <p:childTnLst>
+                                    <p:set>
+                                      <p:cBhvr>
+                                        <p:cTn id="9" dur="1" fill="hold">
+                                          <p:stCondLst>
+                                            <p:cond delay="0"/>
+                                          </p:stCondLst>
+                                        </p:cTn>
+                                        <p:tgtEl>
+                                          <p:spTgt spid="9"/>
+                                        </p:tgtEl>
+                                        <p:attrNameLst>
+                                          <p:attrName>style.visibility</p:attrName>
+                                        </p:attrNameLst>
+                                      </p:cBhvr>
+                                      <p:to>
+                                        <p:strVal val="visible"/>
+                                      </p:to>
+                                    </p:set>
+                                    <p:animEffect transition="in" filter="fade">
+                                      <p:cBhvr>
+                                        <p:cTn id="10" dur="500"/>
+                                        <p:tgtEl>
+                                          <p:spTgt spid="9"/>
+                                        </p:tgtEl>
+                                      </p:cBhvr>
+                                    </p:animEffect>
+                                  </p:childTnLst>
+                                </p:cTn>
+                              </p:par>
+                              <p:par>
+                                <p:cTn id="11" presetID="51" presetClass="path" presetSubtype="0" repeatCount="indefinite" accel="50000" decel="50000" autoRev="1" fill="hold" nodeType="withEffect">
+                                  <p:stCondLst>
+                                    <p:cond delay="0"/>
+                                  </p:stCondLst>
+                                  <p:childTnLst>
+                                    <p:animMotion origin="layout" path="M -3.54167E-6 -3.7037E-7 L -0.03997 0.0669 C -0.04895 0.08102 -0.05403 0.10208 -0.05403 0.12407 C -0.05403 0.14907 -0.04895 0.16898 -0.03997 0.1831 L -3.54167E-6 0.25 " pathEditMode="relative" rAng="0" ptsTypes="AAAAA">
+                                      <p:cBhvr>
+                                        <p:cTn id="12" dur="2000" fill="hold"/>
+                                        <p:tgtEl>
+                                          <p:spTgt spid="9"/>
+                                        </p:tgtEl>
+                                        <p:attrNameLst>
+                                          <p:attrName>ppt_x</p:attrName>
+                                          <p:attrName>ppt_y</p:attrName>
+                                        </p:attrNameLst>
+                                      </p:cBhvr>
+                                      <p:rCtr x="-2708" y="12500"/>
+                                    </p:animMotion>
+                                  </p:childTnLst>
+                                </p:cTn>
+                              </p:par>
+                              <p:par>
+                                <p:cTn id="13" presetID="10" presetClass="entr" presetSubtype="0" fill="hold" nodeType="withEffect">
+                                  <p:stCondLst>
+                                    <p:cond delay="0"/>
+                                  </p:stCondLst>
+                                  <p:childTnLst>
+                                    <p:set>
+                                      <p:cBhvr>
+                                        <p:cTn id="14" dur="1" fill="hold">
+                                          <p:stCondLst>
+                                            <p:cond delay="0"/>
+                                          </p:stCondLst>
+                                        </p:cTn>
+                                        <p:tgtEl>
+                                          <p:spTgt spid="10"/>
+                                        </p:tgtEl>
+                                        <p:attrNameLst>
+                                          <p:attrName>style.visibility</p:attrName>
+                                        </p:attrNameLst>
+                                      </p:cBhvr>
+                                      <p:to>
+                                        <p:strVal val="visible"/>
+                                      </p:to>
+                                    </p:set>
+                                    <p:animEffect transition="in" filter="fade">
+                                      <p:cBhvr>
+                                        <p:cTn id="15" dur="500"/>
+                                        <p:tgtEl>
+                                          <p:spTgt spid="10"/>
+                                        </p:tgtEl>
+                                      </p:cBhvr>
+                                    </p:animEffect>
+                                  </p:childTnLst>
+                                </p:cTn>
+                              </p:par>
+                              <p:par>
+                                <p:cTn id="16" presetID="1" presetClass="path" presetSubtype="0" repeatCount="indefinite" accel="50000" decel="50000" autoRev="1" fill="hold" nodeType="withEffect">
+                                  <p:stCondLst>
+                                    <p:cond delay="0"/>
+                                  </p:stCondLst>
+                                  <p:childTnLst>
+                                    <p:animMotion origin="layout" path="M -0.04909 -0.08658 C -0.00925 -0.08658 0.02305 -0.03056 0.02305 0.03842 C 0.02305 0.1074 -0.00925 0.16342 -0.04909 0.16342 C -0.08893 0.16342 -0.1211 0.1074 -0.1211 0.03842 C -0.1211 -0.03056 -0.08893 -0.08658 -0.04909 -0.08658 Z " pathEditMode="relative" rAng="0" ptsTypes="AAAAA">
+                                      <p:cBhvr>
+                                        <p:cTn id="17" dur="4000" fill="hold"/>
+                                        <p:tgtEl>
+                                          <p:spTgt spid="10"/>
+                                        </p:tgtEl>
+                                        <p:attrNameLst>
+                                          <p:attrName>ppt_x</p:attrName>
+                                          <p:attrName>ppt_y</p:attrName>
+                                        </p:attrNameLst>
+                                      </p:cBhvr>
+                                      <p:rCtr x="0" y="12500"/>
+                                    </p:animMotion>
+                                  </p:childTnLst>
+                                </p:cTn>
+                              </p:par>
+                            </p:childTnLst>
+                          </p:cTn>
+                        </p:par>
+                      </p:childTnLst>
+                    </p:cTn>
+                  </p:par>
+                </p:childTnLst>
+              </p:cTn>
+              <p:prevCondLst>
+                <p:cond evt="onPrev" delay="0">
+                  <p:tgtEl>
+                    <p:sldTgt/>
+                  </p:tgtEl>
+                </p:cond>
+              </p:prevCondLst>
+              <p:nextCondLst>
+                <p:cond evt="onNext" delay="0">
+                  <p:tgtEl>
+                    <p:sldTgt/>
+                  </p:tgtEl>
+                </p:cond>
+              </p:nextCondLst>
+            </p:seq>
+          </p:childTnLst>
+        </p:cTn>
+      </p:par>
+    </p:tnLst>
+    <p:bldLst>
+      <p:bldP spid="6" grpId="0"/>
+    </p:bldLst>
+  </p:timing>
+</p:sld>
+</file>
+
+<file path=ppt/slides/slide14.xml><?xml version="1.0" encoding="utf-8"?>
+<p:sld xmlns:a="http://schemas.openxmlformats.org/drawingml/2006/main" xmlns:r="http://schemas.openxmlformats.org/officeDocument/2006/relationships" xmlns:p="http://schemas.openxmlformats.org/presentationml/2006/main">
+  <p:cSld>
+    <p:spTree>
+      <p:nvGrpSpPr>
+        <p:cNvPr id="1" name=""/>
+        <p:cNvGrpSpPr/>
+        <p:nvPr/>
+      </p:nvGrpSpPr>
+      <p:grpSpPr>
+        <a:xfrm>
+          <a:off x="0" y="0"/>
+          <a:ext cx="0" cy="0"/>
+          <a:chOff x="0" y="0"/>
+          <a:chExt cx="0" cy="0"/>
+        </a:xfrm>
+      </p:grpSpPr>
+      <p:pic>
+        <p:nvPicPr>
+          <p:cNvPr id="5" name="Espaço Reservado para Conteúdo 4">
+            <a:extLst>
+              <a:ext uri="{FF2B5EF4-FFF2-40B4-BE49-F238E27FC236}">
+                <a16:creationId xmlns:a16="http://schemas.microsoft.com/office/drawing/2014/main" id="{DEBCF998-65B9-41B2-A535-E5741DD64BE5}"/>
+              </a:ext>
+            </a:extLst>
+          </p:cNvPr>
+          <p:cNvPicPr>
+            <a:picLocks noGrp="1" noChangeAspect="1"/>
+          </p:cNvPicPr>
+          <p:nvPr>
+            <p:ph idx="1"/>
+          </p:nvPr>
+        </p:nvPicPr>
+        <p:blipFill>
+          <a:blip r:embed="rId3">
+            <a:extLst>
+              <a:ext uri="{28A0092B-C50C-407E-A947-70E740481C1C}">
+                <a14:useLocalDpi xmlns:a14="http://schemas.microsoft.com/office/drawing/2010/main" val="0"/>
+              </a:ext>
+            </a:extLst>
+          </a:blip>
+          <a:stretch>
+            <a:fillRect/>
+          </a:stretch>
+        </p:blipFill>
+        <p:spPr>
+          <a:xfrm>
+            <a:off x="-11088" y="1"/>
+            <a:ext cx="12203088" cy="6881654"/>
+          </a:xfrm>
+        </p:spPr>
+      </p:pic>
+      <p:pic>
+        <p:nvPicPr>
+          <p:cNvPr id="9" name="Gráfico 8">
+            <a:extLst>
+              <a:ext uri="{FF2B5EF4-FFF2-40B4-BE49-F238E27FC236}">
+                <a16:creationId xmlns:a16="http://schemas.microsoft.com/office/drawing/2014/main" id="{8951ED2D-02AB-4784-A820-1B65DE4713F5}"/>
+              </a:ext>
+            </a:extLst>
+          </p:cNvPr>
+          <p:cNvPicPr>
+            <a:picLocks noChangeAspect="1"/>
+          </p:cNvPicPr>
+          <p:nvPr/>
+        </p:nvPicPr>
+        <p:blipFill>
+          <a:blip r:embed="rId4">
+            <a:extLst>
+              <a:ext uri="{96DAC541-7B7A-43D3-8B79-37D633B846F1}">
+                <asvg:svgBlip xmlns:asvg="http://schemas.microsoft.com/office/drawing/2016/SVG/main" r:embed="rId5"/>
+              </a:ext>
+            </a:extLst>
+          </a:blip>
+          <a:stretch>
+            <a:fillRect/>
+          </a:stretch>
+        </p:blipFill>
+        <p:spPr>
+          <a:xfrm>
+            <a:off x="5497357" y="2473134"/>
+            <a:ext cx="185616" cy="219365"/>
+          </a:xfrm>
+          <a:prstGeom prst="rect">
+            <a:avLst/>
+          </a:prstGeom>
+        </p:spPr>
+      </p:pic>
+      <p:pic>
+        <p:nvPicPr>
+          <p:cNvPr id="10" name="Gráfico 9">
+            <a:extLst>
+              <a:ext uri="{FF2B5EF4-FFF2-40B4-BE49-F238E27FC236}">
+                <a16:creationId xmlns:a16="http://schemas.microsoft.com/office/drawing/2014/main" id="{FDE0F12D-8D89-4BEF-85B4-ADA531FBBE17}"/>
+              </a:ext>
+            </a:extLst>
+          </p:cNvPr>
+          <p:cNvPicPr>
+            <a:picLocks noChangeAspect="1"/>
+          </p:cNvPicPr>
+          <p:nvPr/>
+        </p:nvPicPr>
+        <p:blipFill>
+          <a:blip r:embed="rId4">
+            <a:extLst>
+              <a:ext uri="{96DAC541-7B7A-43D3-8B79-37D633B846F1}">
+                <asvg:svgBlip xmlns:asvg="http://schemas.microsoft.com/office/drawing/2016/SVG/main" r:embed="rId5"/>
+              </a:ext>
+            </a:extLst>
+          </a:blip>
+          <a:stretch>
+            <a:fillRect/>
+          </a:stretch>
+        </p:blipFill>
+        <p:spPr>
+          <a:xfrm>
+            <a:off x="6565133" y="3554365"/>
+            <a:ext cx="107465" cy="127002"/>
+          </a:xfrm>
+          <a:prstGeom prst="rect">
+            <a:avLst/>
+          </a:prstGeom>
+        </p:spPr>
+      </p:pic>
+      <p:sp>
+        <p:nvSpPr>
+          <p:cNvPr id="6" name="Título 1">
+            <a:extLst>
+              <a:ext uri="{FF2B5EF4-FFF2-40B4-BE49-F238E27FC236}">
+                <a16:creationId xmlns:a16="http://schemas.microsoft.com/office/drawing/2014/main" id="{EC993F68-2ABC-472C-9DAA-F49885B6553A}"/>
+              </a:ext>
+            </a:extLst>
+          </p:cNvPr>
+          <p:cNvSpPr>
+            <a:spLocks noGrp="1"/>
+          </p:cNvSpPr>
+          <p:nvPr>
+            <p:ph type="title"/>
+          </p:nvPr>
+        </p:nvSpPr>
+        <p:spPr>
+          <a:xfrm>
+            <a:off x="29290" y="2418011"/>
+            <a:ext cx="12162710" cy="2021978"/>
+          </a:xfrm>
+        </p:spPr>
+        <p:txBody>
+          <a:bodyPr>
+            <a:normAutofit/>
+          </a:bodyPr>
+          <a:lstStyle/>
+          <a:p>
+            <a:pPr algn="ctr"/>
+            <a:r>
+              <a:rPr lang="pt-BR" sz="3600" dirty="0">
+                <a:solidFill>
+                  <a:schemeClr val="bg1"/>
+                </a:solidFill>
+                <a:latin typeface="Nunito Light" pitchFamily="2" charset="0"/>
+              </a:rPr>
+              <a:t>DEMO</a:t>
+            </a:r>
+            <a:br>
+              <a:rPr lang="pt-BR" sz="6000" dirty="0">
+                <a:solidFill>
+                  <a:schemeClr val="bg1"/>
+                </a:solidFill>
+                <a:latin typeface="Nunito" pitchFamily="2" charset="77"/>
+              </a:rPr>
+            </a:br>
+            <a:r>
+              <a:rPr lang="pt-BR" sz="6000" dirty="0">
+                <a:solidFill>
+                  <a:schemeClr val="bg1"/>
+                </a:solidFill>
+                <a:latin typeface="Nunito" pitchFamily="2" charset="77"/>
+              </a:rPr>
+              <a:t>CRUD com EF Core</a:t>
+            </a:r>
+            <a:endParaRPr lang="pt-BR" sz="4000" dirty="0">
+              <a:solidFill>
+                <a:schemeClr val="bg1"/>
+              </a:solidFill>
+              <a:latin typeface="Nunito" pitchFamily="2" charset="77"/>
+            </a:endParaRPr>
+          </a:p>
+        </p:txBody>
+      </p:sp>
+    </p:spTree>
+    <p:extLst>
+      <p:ext uri="{BB962C8B-B14F-4D97-AF65-F5344CB8AC3E}">
+        <p14:creationId xmlns:p14="http://schemas.microsoft.com/office/powerpoint/2010/main" val="3377369270"/>
+      </p:ext>
+    </p:extLst>
+  </p:cSld>
+  <p:clrMapOvr>
+    <a:masterClrMapping/>
+  </p:clrMapOvr>
+  <mc:AlternateContent xmlns:mc="http://schemas.openxmlformats.org/markup-compatibility/2006" xmlns:p14="http://schemas.microsoft.com/office/powerpoint/2010/main">
+    <mc:Choice Requires="p14">
+      <p:transition spd="med" p14:dur="700">
+        <p:fade/>
+      </p:transition>
+    </mc:Choice>
+    <mc:Fallback xmlns="">
+      <p:transition spd="med">
+        <p:fade/>
+      </p:transition>
+    </mc:Fallback>
+  </mc:AlternateContent>
+  <p:timing>
+    <p:tnLst>
+      <p:par>
+        <p:cTn id="1" dur="indefinite" restart="never" nodeType="tmRoot">
+          <p:childTnLst>
+            <p:seq concurrent="1" nextAc="seek">
+              <p:cTn id="2" dur="indefinite" nodeType="mainSeq">
+                <p:childTnLst>
+                  <p:par>
+                    <p:cTn id="3" fill="hold">
+                      <p:stCondLst>
+                        <p:cond delay="indefinite"/>
+                        <p:cond evt="onBegin" delay="0">
+                          <p:tn val="2"/>
+                        </p:cond>
+                      </p:stCondLst>
+                      <p:childTnLst>
+                        <p:par>
+                          <p:cTn id="4" fill="hold">
+                            <p:stCondLst>
+                              <p:cond delay="0"/>
+                            </p:stCondLst>
+                            <p:childTnLst>
+                              <p:par>
+                                <p:cTn id="5" presetID="10" presetClass="entr" presetSubtype="0" fill="hold" grpId="0" nodeType="afterEffect">
+                                  <p:stCondLst>
+                                    <p:cond delay="0"/>
+                                  </p:stCondLst>
+                                  <p:childTnLst>
+                                    <p:set>
+                                      <p:cBhvr>
+                                        <p:cTn id="6" dur="1" fill="hold">
+                                          <p:stCondLst>
+                                            <p:cond delay="0"/>
+                                          </p:stCondLst>
+                                        </p:cTn>
+                                        <p:tgtEl>
+                                          <p:spTgt spid="6"/>
+                                        </p:tgtEl>
+                                        <p:attrNameLst>
+                                          <p:attrName>style.visibility</p:attrName>
+                                        </p:attrNameLst>
+                                      </p:cBhvr>
+                                      <p:to>
+                                        <p:strVal val="visible"/>
+                                      </p:to>
+                                    </p:set>
+                                    <p:animEffect transition="in" filter="fade">
+                                      <p:cBhvr>
+                                        <p:cTn id="7" dur="500"/>
+                                        <p:tgtEl>
+                                          <p:spTgt spid="6"/>
+                                        </p:tgtEl>
+                                      </p:cBhvr>
+                                    </p:animEffect>
+                                  </p:childTnLst>
+                                </p:cTn>
+                              </p:par>
+                              <p:par>
+                                <p:cTn id="8" presetID="10" presetClass="entr" presetSubtype="0" fill="hold" nodeType="withEffect">
+                                  <p:stCondLst>
+                                    <p:cond delay="0"/>
+                                  </p:stCondLst>
+                                  <p:childTnLst>
+                                    <p:set>
+                                      <p:cBhvr>
+                                        <p:cTn id="9" dur="1" fill="hold">
+                                          <p:stCondLst>
+                                            <p:cond delay="0"/>
+                                          </p:stCondLst>
+                                        </p:cTn>
+                                        <p:tgtEl>
+                                          <p:spTgt spid="9"/>
+                                        </p:tgtEl>
+                                        <p:attrNameLst>
+                                          <p:attrName>style.visibility</p:attrName>
+                                        </p:attrNameLst>
+                                      </p:cBhvr>
+                                      <p:to>
+                                        <p:strVal val="visible"/>
+                                      </p:to>
+                                    </p:set>
+                                    <p:animEffect transition="in" filter="fade">
+                                      <p:cBhvr>
+                                        <p:cTn id="10" dur="500"/>
+                                        <p:tgtEl>
+                                          <p:spTgt spid="9"/>
+                                        </p:tgtEl>
+                                      </p:cBhvr>
+                                    </p:animEffect>
+                                  </p:childTnLst>
+                                </p:cTn>
+                              </p:par>
+                              <p:par>
+                                <p:cTn id="11" presetID="51" presetClass="path" presetSubtype="0" repeatCount="indefinite" accel="50000" decel="50000" autoRev="1" fill="hold" nodeType="withEffect">
+                                  <p:stCondLst>
+                                    <p:cond delay="0"/>
+                                  </p:stCondLst>
+                                  <p:childTnLst>
+                                    <p:animMotion origin="layout" path="M -3.54167E-6 -3.7037E-7 L -0.03997 0.0669 C -0.04895 0.08102 -0.05403 0.10208 -0.05403 0.12407 C -0.05403 0.14907 -0.04895 0.16898 -0.03997 0.1831 L -3.54167E-6 0.25 " pathEditMode="relative" rAng="0" ptsTypes="AAAAA">
+                                      <p:cBhvr>
+                                        <p:cTn id="12" dur="2000" fill="hold"/>
+                                        <p:tgtEl>
+                                          <p:spTgt spid="9"/>
+                                        </p:tgtEl>
+                                        <p:attrNameLst>
+                                          <p:attrName>ppt_x</p:attrName>
+                                          <p:attrName>ppt_y</p:attrName>
+                                        </p:attrNameLst>
+                                      </p:cBhvr>
+                                      <p:rCtr x="-2708" y="12500"/>
+                                    </p:animMotion>
+                                  </p:childTnLst>
+                                </p:cTn>
+                              </p:par>
+                              <p:par>
+                                <p:cTn id="13" presetID="10" presetClass="entr" presetSubtype="0" fill="hold" nodeType="withEffect">
+                                  <p:stCondLst>
+                                    <p:cond delay="0"/>
+                                  </p:stCondLst>
+                                  <p:childTnLst>
+                                    <p:set>
+                                      <p:cBhvr>
+                                        <p:cTn id="14" dur="1" fill="hold">
+                                          <p:stCondLst>
+                                            <p:cond delay="0"/>
+                                          </p:stCondLst>
+                                        </p:cTn>
+                                        <p:tgtEl>
+                                          <p:spTgt spid="10"/>
+                                        </p:tgtEl>
+                                        <p:attrNameLst>
+                                          <p:attrName>style.visibility</p:attrName>
+                                        </p:attrNameLst>
+                                      </p:cBhvr>
+                                      <p:to>
+                                        <p:strVal val="visible"/>
+                                      </p:to>
+                                    </p:set>
+                                    <p:animEffect transition="in" filter="fade">
+                                      <p:cBhvr>
+                                        <p:cTn id="15" dur="500"/>
+                                        <p:tgtEl>
+                                          <p:spTgt spid="10"/>
+                                        </p:tgtEl>
+                                      </p:cBhvr>
+                                    </p:animEffect>
+                                  </p:childTnLst>
+                                </p:cTn>
+                              </p:par>
+                              <p:par>
+                                <p:cTn id="16" presetID="1" presetClass="path" presetSubtype="0" repeatCount="indefinite" accel="50000" decel="50000" autoRev="1" fill="hold" nodeType="withEffect">
+                                  <p:stCondLst>
+                                    <p:cond delay="0"/>
+                                  </p:stCondLst>
+                                  <p:childTnLst>
+                                    <p:animMotion origin="layout" path="M -0.04909 -0.08658 C -0.00925 -0.08658 0.02305 -0.03056 0.02305 0.03842 C 0.02305 0.1074 -0.00925 0.16342 -0.04909 0.16342 C -0.08893 0.16342 -0.1211 0.1074 -0.1211 0.03842 C -0.1211 -0.03056 -0.08893 -0.08658 -0.04909 -0.08658 Z " pathEditMode="relative" rAng="0" ptsTypes="AAAAA">
+                                      <p:cBhvr>
+                                        <p:cTn id="17" dur="4000" fill="hold"/>
+                                        <p:tgtEl>
+                                          <p:spTgt spid="10"/>
+                                        </p:tgtEl>
+                                        <p:attrNameLst>
+                                          <p:attrName>ppt_x</p:attrName>
+                                          <p:attrName>ppt_y</p:attrName>
+                                        </p:attrNameLst>
+                                      </p:cBhvr>
+                                      <p:rCtr x="0" y="12500"/>
+                                    </p:animMotion>
+                                  </p:childTnLst>
+                                </p:cTn>
+                              </p:par>
+                            </p:childTnLst>
+                          </p:cTn>
+                        </p:par>
+                      </p:childTnLst>
+                    </p:cTn>
+                  </p:par>
+                </p:childTnLst>
+              </p:cTn>
+              <p:prevCondLst>
+                <p:cond evt="onPrev" delay="0">
+                  <p:tgtEl>
+                    <p:sldTgt/>
+                  </p:tgtEl>
+                </p:cond>
+              </p:prevCondLst>
+              <p:nextCondLst>
+                <p:cond evt="onNext" delay="0">
+                  <p:tgtEl>
+                    <p:sldTgt/>
+                  </p:tgtEl>
+                </p:cond>
+              </p:nextCondLst>
+            </p:seq>
+          </p:childTnLst>
+        </p:cTn>
+      </p:par>
+    </p:tnLst>
+    <p:bldLst>
+      <p:bldP spid="6" grpId="0"/>
+    </p:bldLst>
+  </p:timing>
+</p:sld>
+</file>
+
+<file path=ppt/slides/slide15.xml><?xml version="1.0" encoding="utf-8"?>
+<p:sld xmlns:a="http://schemas.openxmlformats.org/drawingml/2006/main" xmlns:r="http://schemas.openxmlformats.org/officeDocument/2006/relationships" xmlns:p="http://schemas.openxmlformats.org/presentationml/2006/main">
+  <p:cSld>
+    <p:spTree>
+      <p:nvGrpSpPr>
+        <p:cNvPr id="1" name=""/>
+        <p:cNvGrpSpPr/>
+        <p:nvPr/>
+      </p:nvGrpSpPr>
+      <p:grpSpPr>
+        <a:xfrm>
+          <a:off x="0" y="0"/>
+          <a:ext cx="0" cy="0"/>
+          <a:chOff x="0" y="0"/>
+          <a:chExt cx="0" cy="0"/>
+        </a:xfrm>
+      </p:grpSpPr>
+      <p:pic>
+        <p:nvPicPr>
+          <p:cNvPr id="5" name="Espaço Reservado para Conteúdo 4">
+            <a:extLst>
+              <a:ext uri="{FF2B5EF4-FFF2-40B4-BE49-F238E27FC236}">
+                <a16:creationId xmlns:a16="http://schemas.microsoft.com/office/drawing/2014/main" id="{DEBCF998-65B9-41B2-A535-E5741DD64BE5}"/>
+              </a:ext>
+            </a:extLst>
+          </p:cNvPr>
+          <p:cNvPicPr>
+            <a:picLocks noGrp="1" noChangeAspect="1"/>
+          </p:cNvPicPr>
+          <p:nvPr>
+            <p:ph idx="1"/>
+          </p:nvPr>
+        </p:nvPicPr>
+        <p:blipFill>
+          <a:blip r:embed="rId2">
+            <a:extLst>
+              <a:ext uri="{28A0092B-C50C-407E-A947-70E740481C1C}">
+                <a14:useLocalDpi xmlns:a14="http://schemas.microsoft.com/office/drawing/2010/main" val="0"/>
+              </a:ext>
+            </a:extLst>
+          </a:blip>
+          <a:stretch>
+            <a:fillRect/>
+          </a:stretch>
+        </p:blipFill>
+        <p:spPr>
+          <a:xfrm>
+            <a:off x="-11088" y="1"/>
+            <a:ext cx="12203088" cy="6881654"/>
+          </a:xfrm>
+        </p:spPr>
+      </p:pic>
+      <p:pic>
+        <p:nvPicPr>
+          <p:cNvPr id="9" name="Gráfico 8">
+            <a:extLst>
+              <a:ext uri="{FF2B5EF4-FFF2-40B4-BE49-F238E27FC236}">
+                <a16:creationId xmlns:a16="http://schemas.microsoft.com/office/drawing/2014/main" id="{8951ED2D-02AB-4784-A820-1B65DE4713F5}"/>
+              </a:ext>
+            </a:extLst>
+          </p:cNvPr>
+          <p:cNvPicPr>
+            <a:picLocks noChangeAspect="1"/>
+          </p:cNvPicPr>
+          <p:nvPr/>
+        </p:nvPicPr>
+        <p:blipFill>
+          <a:blip r:embed="rId3">
+            <a:extLst>
+              <a:ext uri="{96DAC541-7B7A-43D3-8B79-37D633B846F1}">
+                <asvg:svgBlip xmlns:asvg="http://schemas.microsoft.com/office/drawing/2016/SVG/main" r:embed="rId4"/>
+              </a:ext>
+            </a:extLst>
+          </a:blip>
+          <a:stretch>
+            <a:fillRect/>
+          </a:stretch>
+        </p:blipFill>
+        <p:spPr>
+          <a:xfrm>
+            <a:off x="5497357" y="2473134"/>
+            <a:ext cx="185616" cy="219365"/>
+          </a:xfrm>
+          <a:prstGeom prst="rect">
+            <a:avLst/>
+          </a:prstGeom>
+        </p:spPr>
+      </p:pic>
+      <p:pic>
+        <p:nvPicPr>
+          <p:cNvPr id="10" name="Gráfico 9">
+            <a:extLst>
+              <a:ext uri="{FF2B5EF4-FFF2-40B4-BE49-F238E27FC236}">
+                <a16:creationId xmlns:a16="http://schemas.microsoft.com/office/drawing/2014/main" id="{FDE0F12D-8D89-4BEF-85B4-ADA531FBBE17}"/>
+              </a:ext>
+            </a:extLst>
+          </p:cNvPr>
+          <p:cNvPicPr>
+            <a:picLocks noChangeAspect="1"/>
+          </p:cNvPicPr>
+          <p:nvPr/>
+        </p:nvPicPr>
+        <p:blipFill>
+          <a:blip r:embed="rId3">
+            <a:extLst>
+              <a:ext uri="{96DAC541-7B7A-43D3-8B79-37D633B846F1}">
+                <asvg:svgBlip xmlns:asvg="http://schemas.microsoft.com/office/drawing/2016/SVG/main" r:embed="rId4"/>
+              </a:ext>
+            </a:extLst>
+          </a:blip>
+          <a:stretch>
+            <a:fillRect/>
+          </a:stretch>
+        </p:blipFill>
+        <p:spPr>
+          <a:xfrm>
+            <a:off x="6565133" y="3554365"/>
+            <a:ext cx="107465" cy="127002"/>
+          </a:xfrm>
+          <a:prstGeom prst="rect">
+            <a:avLst/>
+          </a:prstGeom>
+        </p:spPr>
+      </p:pic>
+      <p:sp>
+        <p:nvSpPr>
+          <p:cNvPr id="6" name="Título 1">
+            <a:extLst>
+              <a:ext uri="{FF2B5EF4-FFF2-40B4-BE49-F238E27FC236}">
+                <a16:creationId xmlns:a16="http://schemas.microsoft.com/office/drawing/2014/main" id="{EC993F68-2ABC-472C-9DAA-F49885B6553A}"/>
+              </a:ext>
+            </a:extLst>
+          </p:cNvPr>
+          <p:cNvSpPr>
+            <a:spLocks noGrp="1"/>
+          </p:cNvSpPr>
+          <p:nvPr>
+            <p:ph type="title"/>
+          </p:nvPr>
+        </p:nvSpPr>
+        <p:spPr>
+          <a:xfrm>
+            <a:off x="29290" y="2418011"/>
+            <a:ext cx="12162710" cy="2021978"/>
+          </a:xfrm>
+        </p:spPr>
+        <p:txBody>
+          <a:bodyPr>
+            <a:normAutofit/>
+          </a:bodyPr>
+          <a:lstStyle/>
+          <a:p>
+            <a:pPr algn="ctr"/>
+            <a:r>
+              <a:rPr lang="pt-BR" sz="7300" dirty="0">
+                <a:solidFill>
+                  <a:schemeClr val="bg1"/>
+                </a:solidFill>
+                <a:latin typeface="Nunito" pitchFamily="2" charset="77"/>
+              </a:rPr>
+              <a:t>Mapeamento</a:t>
+            </a:r>
+            <a:endParaRPr lang="pt-BR" sz="5400" dirty="0">
+              <a:solidFill>
+                <a:schemeClr val="bg1"/>
+              </a:solidFill>
+              <a:latin typeface="Nunito" pitchFamily="2" charset="77"/>
+            </a:endParaRPr>
+          </a:p>
+        </p:txBody>
+      </p:sp>
+    </p:spTree>
+    <p:extLst>
+      <p:ext uri="{BB962C8B-B14F-4D97-AF65-F5344CB8AC3E}">
+        <p14:creationId xmlns:p14="http://schemas.microsoft.com/office/powerpoint/2010/main" val="2288919344"/>
+      </p:ext>
+    </p:extLst>
+  </p:cSld>
+  <p:clrMapOvr>
+    <a:masterClrMapping/>
+  </p:clrMapOvr>
+  <mc:AlternateContent xmlns:mc="http://schemas.openxmlformats.org/markup-compatibility/2006" xmlns:p14="http://schemas.microsoft.com/office/powerpoint/2010/main">
+    <mc:Choice Requires="p14">
+      <p:transition spd="med" p14:dur="700">
+        <p:fade/>
+      </p:transition>
+    </mc:Choice>
+    <mc:Fallback xmlns="">
+      <p:transition spd="med">
+        <p:fade/>
+      </p:transition>
+    </mc:Fallback>
+  </mc:AlternateContent>
+  <p:timing>
+    <p:tnLst>
+      <p:par>
+        <p:cTn id="1" dur="indefinite" restart="never" nodeType="tmRoot">
+          <p:childTnLst>
+            <p:seq concurrent="1" nextAc="seek">
+              <p:cTn id="2" dur="indefinite" nodeType="mainSeq">
+                <p:childTnLst>
+                  <p:par>
+                    <p:cTn id="3" fill="hold">
+                      <p:stCondLst>
+                        <p:cond delay="indefinite"/>
+                        <p:cond evt="onBegin" delay="0">
+                          <p:tn val="2"/>
+                        </p:cond>
+                      </p:stCondLst>
+                      <p:childTnLst>
+                        <p:par>
+                          <p:cTn id="4" fill="hold">
+                            <p:stCondLst>
+                              <p:cond delay="0"/>
+                            </p:stCondLst>
+                            <p:childTnLst>
+                              <p:par>
+                                <p:cTn id="5" presetID="10" presetClass="entr" presetSubtype="0" fill="hold" grpId="0" nodeType="afterEffect">
+                                  <p:stCondLst>
+                                    <p:cond delay="0"/>
+                                  </p:stCondLst>
+                                  <p:childTnLst>
+                                    <p:set>
+                                      <p:cBhvr>
+                                        <p:cTn id="6" dur="1" fill="hold">
+                                          <p:stCondLst>
+                                            <p:cond delay="0"/>
+                                          </p:stCondLst>
+                                        </p:cTn>
+                                        <p:tgtEl>
+                                          <p:spTgt spid="6"/>
+                                        </p:tgtEl>
+                                        <p:attrNameLst>
+                                          <p:attrName>style.visibility</p:attrName>
+                                        </p:attrNameLst>
+                                      </p:cBhvr>
+                                      <p:to>
+                                        <p:strVal val="visible"/>
+                                      </p:to>
+                                    </p:set>
+                                    <p:animEffect transition="in" filter="fade">
+                                      <p:cBhvr>
+                                        <p:cTn id="7" dur="500"/>
+                                        <p:tgtEl>
+                                          <p:spTgt spid="6"/>
+                                        </p:tgtEl>
+                                      </p:cBhvr>
+                                    </p:animEffect>
+                                  </p:childTnLst>
+                                </p:cTn>
+                              </p:par>
+                              <p:par>
+                                <p:cTn id="8" presetID="10" presetClass="entr" presetSubtype="0" fill="hold" nodeType="withEffect">
+                                  <p:stCondLst>
+                                    <p:cond delay="0"/>
+                                  </p:stCondLst>
+                                  <p:childTnLst>
+                                    <p:set>
+                                      <p:cBhvr>
+                                        <p:cTn id="9" dur="1" fill="hold">
+                                          <p:stCondLst>
+                                            <p:cond delay="0"/>
+                                          </p:stCondLst>
+                                        </p:cTn>
+                                        <p:tgtEl>
+                                          <p:spTgt spid="9"/>
+                                        </p:tgtEl>
+                                        <p:attrNameLst>
+                                          <p:attrName>style.visibility</p:attrName>
+                                        </p:attrNameLst>
+                                      </p:cBhvr>
+                                      <p:to>
+                                        <p:strVal val="visible"/>
+                                      </p:to>
+                                    </p:set>
+                                    <p:animEffect transition="in" filter="fade">
+                                      <p:cBhvr>
+                                        <p:cTn id="10" dur="500"/>
+                                        <p:tgtEl>
+                                          <p:spTgt spid="9"/>
+                                        </p:tgtEl>
+                                      </p:cBhvr>
+                                    </p:animEffect>
+                                  </p:childTnLst>
+                                </p:cTn>
+                              </p:par>
+                              <p:par>
+                                <p:cTn id="11" presetID="51" presetClass="path" presetSubtype="0" repeatCount="indefinite" accel="50000" decel="50000" autoRev="1" fill="hold" nodeType="withEffect">
+                                  <p:stCondLst>
+                                    <p:cond delay="0"/>
+                                  </p:stCondLst>
+                                  <p:childTnLst>
+                                    <p:animMotion origin="layout" path="M -3.54167E-6 -3.7037E-7 L -0.03997 0.0669 C -0.04895 0.08102 -0.05403 0.10208 -0.05403 0.12407 C -0.05403 0.14907 -0.04895 0.16898 -0.03997 0.1831 L -3.54167E-6 0.25 " pathEditMode="relative" rAng="0" ptsTypes="AAAAA">
+                                      <p:cBhvr>
+                                        <p:cTn id="12" dur="2000" fill="hold"/>
+                                        <p:tgtEl>
+                                          <p:spTgt spid="9"/>
+                                        </p:tgtEl>
+                                        <p:attrNameLst>
+                                          <p:attrName>ppt_x</p:attrName>
+                                          <p:attrName>ppt_y</p:attrName>
+                                        </p:attrNameLst>
+                                      </p:cBhvr>
+                                      <p:rCtr x="-2708" y="12500"/>
+                                    </p:animMotion>
+                                  </p:childTnLst>
+                                </p:cTn>
+                              </p:par>
+                              <p:par>
+                                <p:cTn id="13" presetID="10" presetClass="entr" presetSubtype="0" fill="hold" nodeType="withEffect">
+                                  <p:stCondLst>
+                                    <p:cond delay="0"/>
+                                  </p:stCondLst>
+                                  <p:childTnLst>
+                                    <p:set>
+                                      <p:cBhvr>
+                                        <p:cTn id="14" dur="1" fill="hold">
+                                          <p:stCondLst>
+                                            <p:cond delay="0"/>
+                                          </p:stCondLst>
+                                        </p:cTn>
+                                        <p:tgtEl>
+                                          <p:spTgt spid="10"/>
+                                        </p:tgtEl>
+                                        <p:attrNameLst>
+                                          <p:attrName>style.visibility</p:attrName>
+                                        </p:attrNameLst>
+                                      </p:cBhvr>
+                                      <p:to>
+                                        <p:strVal val="visible"/>
+                                      </p:to>
+                                    </p:set>
+                                    <p:animEffect transition="in" filter="fade">
+                                      <p:cBhvr>
+                                        <p:cTn id="15" dur="500"/>
+                                        <p:tgtEl>
+                                          <p:spTgt spid="10"/>
+                                        </p:tgtEl>
+                                      </p:cBhvr>
+                                    </p:animEffect>
+                                  </p:childTnLst>
+                                </p:cTn>
+                              </p:par>
+                              <p:par>
+                                <p:cTn id="16" presetID="1" presetClass="path" presetSubtype="0" repeatCount="indefinite" accel="50000" decel="50000" autoRev="1" fill="hold" nodeType="withEffect">
+                                  <p:stCondLst>
+                                    <p:cond delay="0"/>
+                                  </p:stCondLst>
+                                  <p:childTnLst>
+                                    <p:animMotion origin="layout" path="M -0.04909 -0.08658 C -0.00925 -0.08658 0.02305 -0.03056 0.02305 0.03842 C 0.02305 0.1074 -0.00925 0.16342 -0.04909 0.16342 C -0.08893 0.16342 -0.1211 0.1074 -0.1211 0.03842 C -0.1211 -0.03056 -0.08893 -0.08658 -0.04909 -0.08658 Z " pathEditMode="relative" rAng="0" ptsTypes="AAAAA">
+                                      <p:cBhvr>
+                                        <p:cTn id="17" dur="4000" fill="hold"/>
+                                        <p:tgtEl>
+                                          <p:spTgt spid="10"/>
+                                        </p:tgtEl>
+                                        <p:attrNameLst>
+                                          <p:attrName>ppt_x</p:attrName>
+                                          <p:attrName>ppt_y</p:attrName>
+                                        </p:attrNameLst>
+                                      </p:cBhvr>
+                                      <p:rCtr x="0" y="12500"/>
+                                    </p:animMotion>
+                                  </p:childTnLst>
+                                </p:cTn>
+                              </p:par>
+                            </p:childTnLst>
+                          </p:cTn>
+                        </p:par>
+                      </p:childTnLst>
+                    </p:cTn>
+                  </p:par>
+                </p:childTnLst>
+              </p:cTn>
+              <p:prevCondLst>
+                <p:cond evt="onPrev" delay="0">
+                  <p:tgtEl>
+                    <p:sldTgt/>
+                  </p:tgtEl>
+                </p:cond>
+              </p:prevCondLst>
+              <p:nextCondLst>
+                <p:cond evt="onNext" delay="0">
+                  <p:tgtEl>
+                    <p:sldTgt/>
+                  </p:tgtEl>
+                </p:cond>
+              </p:nextCondLst>
+            </p:seq>
+          </p:childTnLst>
+        </p:cTn>
+      </p:par>
+    </p:tnLst>
+    <p:bldLst>
+      <p:bldP spid="6" grpId="0"/>
+    </p:bldLst>
+  </p:timing>
+</p:sld>
+</file>
+
+<file path=ppt/slides/slide16.xml><?xml version="1.0" encoding="utf-8"?>
+<p:sld xmlns:a="http://schemas.openxmlformats.org/drawingml/2006/main" xmlns:r="http://schemas.openxmlformats.org/officeDocument/2006/relationships" xmlns:p="http://schemas.openxmlformats.org/presentationml/2006/main">
+  <p:cSld>
+    <p:spTree>
+      <p:nvGrpSpPr>
+        <p:cNvPr id="1" name=""/>
+        <p:cNvGrpSpPr/>
+        <p:nvPr/>
+      </p:nvGrpSpPr>
+      <p:grpSpPr>
+        <a:xfrm>
+          <a:off x="0" y="0"/>
+          <a:ext cx="0" cy="0"/>
+          <a:chOff x="0" y="0"/>
+          <a:chExt cx="0" cy="0"/>
+        </a:xfrm>
+      </p:grpSpPr>
+      <p:pic>
+        <p:nvPicPr>
+          <p:cNvPr id="7" name="Imagem 6">
+            <a:extLst>
+              <a:ext uri="{FF2B5EF4-FFF2-40B4-BE49-F238E27FC236}">
+                <a16:creationId xmlns:a16="http://schemas.microsoft.com/office/drawing/2014/main" id="{15EF5E79-A320-604B-B8D0-BB7CC7F3BD24}"/>
+              </a:ext>
+            </a:extLst>
+          </p:cNvPr>
+          <p:cNvPicPr>
+            <a:picLocks noChangeAspect="1"/>
+          </p:cNvPicPr>
+          <p:nvPr/>
+        </p:nvPicPr>
+        <p:blipFill>
+          <a:blip r:embed="rId3">
+            <a:extLst>
+              <a:ext uri="{28A0092B-C50C-407E-A947-70E740481C1C}">
+                <a14:useLocalDpi xmlns:a14="http://schemas.microsoft.com/office/drawing/2010/main" val="0"/>
+              </a:ext>
+            </a:extLst>
+          </a:blip>
+          <a:stretch>
+            <a:fillRect/>
+          </a:stretch>
+        </p:blipFill>
+        <p:spPr>
+          <a:xfrm>
+            <a:off x="-1" y="0"/>
+            <a:ext cx="12192001" cy="2021978"/>
+          </a:xfrm>
+          <a:prstGeom prst="rect">
+            <a:avLst/>
+          </a:prstGeom>
+        </p:spPr>
+      </p:pic>
+      <p:sp>
+        <p:nvSpPr>
+          <p:cNvPr id="13" name="Título 1">
+            <a:extLst>
+              <a:ext uri="{FF2B5EF4-FFF2-40B4-BE49-F238E27FC236}">
+                <a16:creationId xmlns:a16="http://schemas.microsoft.com/office/drawing/2014/main" id="{94E1A0D2-D048-46FE-90D3-722FBF740CC7}"/>
+              </a:ext>
+            </a:extLst>
+          </p:cNvPr>
+          <p:cNvSpPr>
+            <a:spLocks noGrp="1"/>
+          </p:cNvSpPr>
+          <p:nvPr>
+            <p:ph type="title"/>
+          </p:nvPr>
+        </p:nvSpPr>
+        <p:spPr>
+          <a:xfrm>
+            <a:off x="2159726" y="0"/>
+            <a:ext cx="9292046" cy="2021978"/>
+          </a:xfrm>
+        </p:spPr>
+        <p:txBody>
+          <a:bodyPr>
+            <a:normAutofit/>
+          </a:bodyPr>
+          <a:lstStyle/>
+          <a:p>
+            <a:r>
+              <a:rPr lang="pt-BR" dirty="0">
+                <a:solidFill>
+                  <a:schemeClr val="bg1"/>
+                </a:solidFill>
+                <a:latin typeface="Nunito" pitchFamily="2" charset="77"/>
+              </a:rPr>
+              <a:t>Mapeamento</a:t>
+            </a:r>
+          </a:p>
+        </p:txBody>
+      </p:sp>
+      <p:pic>
+        <p:nvPicPr>
+          <p:cNvPr id="14" name="Gráfico 13">
+            <a:extLst>
+              <a:ext uri="{FF2B5EF4-FFF2-40B4-BE49-F238E27FC236}">
+                <a16:creationId xmlns:a16="http://schemas.microsoft.com/office/drawing/2014/main" id="{2B5477E9-00BA-4494-BA1B-5466AC45994D}"/>
+              </a:ext>
+            </a:extLst>
+          </p:cNvPr>
+          <p:cNvPicPr>
+            <a:picLocks noChangeAspect="1"/>
+          </p:cNvPicPr>
+          <p:nvPr/>
+        </p:nvPicPr>
+        <p:blipFill>
+          <a:blip r:embed="rId4">
+            <a:extLst>
+              <a:ext uri="{96DAC541-7B7A-43D3-8B79-37D633B846F1}">
+                <asvg:svgBlip xmlns:asvg="http://schemas.microsoft.com/office/drawing/2016/SVG/main" r:embed="rId5"/>
+              </a:ext>
+            </a:extLst>
+          </a:blip>
+          <a:stretch>
+            <a:fillRect/>
+          </a:stretch>
+        </p:blipFill>
+        <p:spPr>
+          <a:xfrm>
+            <a:off x="1097280" y="636835"/>
+            <a:ext cx="610307" cy="705667"/>
+          </a:xfrm>
+          <a:prstGeom prst="rect">
+            <a:avLst/>
+          </a:prstGeom>
+        </p:spPr>
+      </p:pic>
+      <p:sp>
+        <p:nvSpPr>
+          <p:cNvPr id="8" name="CaixaDeTexto 7">
+            <a:extLst>
+              <a:ext uri="{FF2B5EF4-FFF2-40B4-BE49-F238E27FC236}">
+                <a16:creationId xmlns:a16="http://schemas.microsoft.com/office/drawing/2014/main" id="{29557DB5-A419-464F-8DE1-FE557705DF73}"/>
+              </a:ext>
+            </a:extLst>
+          </p:cNvPr>
+          <p:cNvSpPr txBox="1"/>
+          <p:nvPr/>
+        </p:nvSpPr>
+        <p:spPr>
+          <a:xfrm>
+            <a:off x="1097280" y="2719343"/>
+            <a:ext cx="6400800" cy="3416320"/>
+          </a:xfrm>
+          <a:prstGeom prst="rect">
+            <a:avLst/>
+          </a:prstGeom>
+          <a:noFill/>
+        </p:spPr>
+        <p:txBody>
+          <a:bodyPr wrap="square" rtlCol="0">
+            <a:spAutoFit/>
+          </a:bodyPr>
+          <a:lstStyle/>
+          <a:p>
+            <a:r>
+              <a:rPr lang="pt-BR" b="1" dirty="0">
+                <a:latin typeface="Nunito" pitchFamily="2" charset="77"/>
+              </a:rPr>
+              <a:t>O que é?</a:t>
+            </a:r>
+          </a:p>
+          <a:p>
+            <a:pPr marL="285750" indent="-285750">
+              <a:buFontTx/>
+              <a:buChar char="-"/>
+            </a:pPr>
+            <a:r>
+              <a:rPr lang="en-US" dirty="0" err="1">
+                <a:latin typeface="Nunito" pitchFamily="2" charset="77"/>
+              </a:rPr>
+              <a:t>Dê</a:t>
+            </a:r>
+            <a:r>
+              <a:rPr lang="en-US" dirty="0">
+                <a:latin typeface="Nunito" pitchFamily="2" charset="77"/>
+              </a:rPr>
+              <a:t>/Para</a:t>
+            </a:r>
+          </a:p>
+          <a:p>
+            <a:pPr marL="285750" indent="-285750">
+              <a:buFontTx/>
+              <a:buChar char="-"/>
+            </a:pPr>
+            <a:r>
+              <a:rPr lang="en-US" dirty="0" err="1">
+                <a:latin typeface="Nunito" pitchFamily="2" charset="77"/>
+              </a:rPr>
+              <a:t>Diz</a:t>
+            </a:r>
+            <a:r>
+              <a:rPr lang="en-US" dirty="0">
+                <a:latin typeface="Nunito" pitchFamily="2" charset="77"/>
+              </a:rPr>
+              <a:t> qual </a:t>
+            </a:r>
+            <a:r>
+              <a:rPr lang="en-US" dirty="0" err="1">
+                <a:latin typeface="Nunito" pitchFamily="2" charset="77"/>
+              </a:rPr>
+              <a:t>classe</a:t>
+            </a:r>
+            <a:r>
+              <a:rPr lang="en-US" dirty="0">
+                <a:latin typeface="Nunito" pitchFamily="2" charset="77"/>
+              </a:rPr>
+              <a:t> no C# se </a:t>
+            </a:r>
+            <a:r>
+              <a:rPr lang="en-US" dirty="0" err="1">
+                <a:latin typeface="Nunito" pitchFamily="2" charset="77"/>
+              </a:rPr>
+              <a:t>refere</a:t>
+            </a:r>
+            <a:r>
+              <a:rPr lang="en-US" dirty="0">
+                <a:latin typeface="Nunito" pitchFamily="2" charset="77"/>
+              </a:rPr>
+              <a:t> a qual </a:t>
+            </a:r>
+            <a:r>
+              <a:rPr lang="en-US" dirty="0" err="1">
+                <a:latin typeface="Nunito" pitchFamily="2" charset="77"/>
+              </a:rPr>
+              <a:t>tabela</a:t>
+            </a:r>
+            <a:r>
+              <a:rPr lang="en-US" dirty="0">
+                <a:latin typeface="Nunito" pitchFamily="2" charset="77"/>
+              </a:rPr>
+              <a:t> no banco de dados</a:t>
+            </a:r>
+          </a:p>
+          <a:p>
+            <a:pPr marL="285750" indent="-285750">
+              <a:buFontTx/>
+              <a:buChar char="-"/>
+            </a:pPr>
+            <a:r>
+              <a:rPr lang="en-US" dirty="0" err="1">
+                <a:latin typeface="Nunito" pitchFamily="2" charset="77"/>
+              </a:rPr>
+              <a:t>Diz</a:t>
+            </a:r>
+            <a:r>
+              <a:rPr lang="en-US" dirty="0">
+                <a:latin typeface="Nunito" pitchFamily="2" charset="77"/>
+              </a:rPr>
+              <a:t> </a:t>
+            </a:r>
+            <a:r>
+              <a:rPr lang="en-US" dirty="0" err="1">
+                <a:latin typeface="Nunito" pitchFamily="2" charset="77"/>
+              </a:rPr>
+              <a:t>quais</a:t>
+            </a:r>
+            <a:r>
+              <a:rPr lang="en-US" dirty="0">
+                <a:latin typeface="Nunito" pitchFamily="2" charset="77"/>
+              </a:rPr>
+              <a:t> </a:t>
+            </a:r>
+            <a:r>
+              <a:rPr lang="en-US" dirty="0" err="1">
+                <a:latin typeface="Nunito" pitchFamily="2" charset="77"/>
+              </a:rPr>
+              <a:t>propriedades</a:t>
+            </a:r>
+            <a:r>
+              <a:rPr lang="en-US" dirty="0">
+                <a:latin typeface="Nunito" pitchFamily="2" charset="77"/>
+              </a:rPr>
+              <a:t> da </a:t>
+            </a:r>
+            <a:r>
+              <a:rPr lang="en-US" dirty="0" err="1">
+                <a:latin typeface="Nunito" pitchFamily="2" charset="77"/>
+              </a:rPr>
+              <a:t>classe</a:t>
+            </a:r>
+            <a:r>
+              <a:rPr lang="en-US" dirty="0">
+                <a:latin typeface="Nunito" pitchFamily="2" charset="77"/>
+              </a:rPr>
+              <a:t> se </a:t>
+            </a:r>
+            <a:r>
+              <a:rPr lang="en-US" dirty="0" err="1">
+                <a:latin typeface="Nunito" pitchFamily="2" charset="77"/>
+              </a:rPr>
+              <a:t>referem</a:t>
+            </a:r>
+            <a:r>
+              <a:rPr lang="en-US" dirty="0">
+                <a:latin typeface="Nunito" pitchFamily="2" charset="77"/>
+              </a:rPr>
+              <a:t> a </a:t>
+            </a:r>
+            <a:r>
+              <a:rPr lang="en-US" dirty="0" err="1">
+                <a:latin typeface="Nunito" pitchFamily="2" charset="77"/>
+              </a:rPr>
+              <a:t>quais</a:t>
+            </a:r>
+            <a:r>
+              <a:rPr lang="en-US" dirty="0">
+                <a:latin typeface="Nunito" pitchFamily="2" charset="77"/>
+              </a:rPr>
+              <a:t> </a:t>
+            </a:r>
+            <a:r>
+              <a:rPr lang="en-US" dirty="0" err="1">
+                <a:latin typeface="Nunito" pitchFamily="2" charset="77"/>
+              </a:rPr>
+              <a:t>colunas</a:t>
+            </a:r>
+            <a:r>
+              <a:rPr lang="en-US" dirty="0">
+                <a:latin typeface="Nunito" pitchFamily="2" charset="77"/>
+              </a:rPr>
+              <a:t> da </a:t>
+            </a:r>
+            <a:r>
+              <a:rPr lang="en-US" dirty="0" err="1">
+                <a:latin typeface="Nunito" pitchFamily="2" charset="77"/>
+              </a:rPr>
+              <a:t>tabela</a:t>
+            </a:r>
+            <a:r>
+              <a:rPr lang="en-US" dirty="0">
+                <a:latin typeface="Nunito" pitchFamily="2" charset="77"/>
+              </a:rPr>
+              <a:t> </a:t>
+            </a:r>
+            <a:r>
+              <a:rPr lang="en-US" dirty="0" err="1">
+                <a:latin typeface="Nunito" pitchFamily="2" charset="77"/>
+              </a:rPr>
+              <a:t>relacionada</a:t>
+            </a:r>
+            <a:endParaRPr lang="en-US" dirty="0">
+              <a:latin typeface="Nunito" pitchFamily="2" charset="77"/>
+            </a:endParaRPr>
+          </a:p>
+          <a:p>
+            <a:pPr marL="285750" indent="-285750">
+              <a:buFontTx/>
+              <a:buChar char="-"/>
+            </a:pPr>
+            <a:r>
+              <a:rPr lang="en-US" dirty="0">
+                <a:latin typeface="Nunito" pitchFamily="2" charset="77"/>
+              </a:rPr>
+              <a:t>Informa </a:t>
+            </a:r>
+            <a:r>
+              <a:rPr lang="en-US" dirty="0" err="1">
+                <a:latin typeface="Nunito" pitchFamily="2" charset="77"/>
+              </a:rPr>
+              <a:t>os</a:t>
+            </a:r>
+            <a:r>
+              <a:rPr lang="en-US" dirty="0">
+                <a:latin typeface="Nunito" pitchFamily="2" charset="77"/>
+              </a:rPr>
+              <a:t> </a:t>
+            </a:r>
+            <a:r>
+              <a:rPr lang="en-US" dirty="0" err="1">
+                <a:latin typeface="Nunito" pitchFamily="2" charset="77"/>
+              </a:rPr>
+              <a:t>tipos</a:t>
+            </a:r>
+            <a:r>
+              <a:rPr lang="en-US" dirty="0">
+                <a:latin typeface="Nunito" pitchFamily="2" charset="77"/>
+              </a:rPr>
+              <a:t> de dados</a:t>
+            </a:r>
+          </a:p>
+          <a:p>
+            <a:pPr marL="285750" indent="-285750">
+              <a:buFontTx/>
+              <a:buChar char="-"/>
+            </a:pPr>
+            <a:r>
+              <a:rPr lang="en-US" dirty="0" err="1">
+                <a:latin typeface="Nunito" pitchFamily="2" charset="77"/>
+              </a:rPr>
+              <a:t>Permite</a:t>
+            </a:r>
+            <a:r>
+              <a:rPr lang="en-US" dirty="0">
+                <a:latin typeface="Nunito" pitchFamily="2" charset="77"/>
+              </a:rPr>
+              <a:t> </a:t>
+            </a:r>
+            <a:r>
+              <a:rPr lang="en-US" dirty="0" err="1">
+                <a:latin typeface="Nunito" pitchFamily="2" charset="77"/>
+              </a:rPr>
+              <a:t>gerar</a:t>
+            </a:r>
+            <a:r>
+              <a:rPr lang="en-US" dirty="0">
+                <a:latin typeface="Nunito" pitchFamily="2" charset="77"/>
+              </a:rPr>
+              <a:t> o banco </a:t>
+            </a:r>
+            <a:r>
+              <a:rPr lang="en-US" dirty="0" err="1">
+                <a:latin typeface="Nunito" pitchFamily="2" charset="77"/>
+              </a:rPr>
+              <a:t>automaticamente</a:t>
+            </a:r>
+            <a:endParaRPr lang="en-US" dirty="0">
+              <a:latin typeface="Nunito" pitchFamily="2" charset="77"/>
+            </a:endParaRPr>
+          </a:p>
+          <a:p>
+            <a:pPr marL="285750" indent="-285750">
+              <a:buFontTx/>
+              <a:buChar char="-"/>
+            </a:pPr>
+            <a:endParaRPr lang="en-US" dirty="0">
+              <a:latin typeface="Montserrat Light" panose="00000400000000000000" pitchFamily="2" charset="0"/>
+            </a:endParaRPr>
+          </a:p>
+          <a:p>
+            <a:pPr marL="285750" indent="-285750">
+              <a:buFontTx/>
+              <a:buChar char="-"/>
+            </a:pPr>
+            <a:endParaRPr lang="en-US" dirty="0">
+              <a:latin typeface="Montserrat Light" panose="00000400000000000000" pitchFamily="2" charset="0"/>
+            </a:endParaRPr>
+          </a:p>
+          <a:p>
+            <a:pPr marL="285750" indent="-285750">
+              <a:buFontTx/>
+              <a:buChar char="-"/>
+            </a:pPr>
+            <a:endParaRPr lang="pt-BR" dirty="0">
+              <a:latin typeface="Montserrat Light" panose="00000400000000000000" pitchFamily="2" charset="0"/>
+            </a:endParaRPr>
+          </a:p>
+          <a:p>
+            <a:pPr marL="285750" indent="-285750">
+              <a:buFontTx/>
+              <a:buChar char="-"/>
+            </a:pPr>
+            <a:endParaRPr lang="pt-BR" dirty="0">
+              <a:latin typeface="Montserrat Light" panose="00000400000000000000" pitchFamily="2" charset="0"/>
+            </a:endParaRPr>
+          </a:p>
+        </p:txBody>
+      </p:sp>
+      <p:pic>
+        <p:nvPicPr>
+          <p:cNvPr id="4" name="Gráfico 3">
+            <a:extLst>
+              <a:ext uri="{FF2B5EF4-FFF2-40B4-BE49-F238E27FC236}">
+                <a16:creationId xmlns:a16="http://schemas.microsoft.com/office/drawing/2014/main" id="{EE9C2205-0403-470A-B555-2C78D41EFF3C}"/>
+              </a:ext>
+            </a:extLst>
+          </p:cNvPr>
+          <p:cNvPicPr>
+            <a:picLocks noChangeAspect="1"/>
+          </p:cNvPicPr>
+          <p:nvPr/>
+        </p:nvPicPr>
+        <p:blipFill>
+          <a:blip r:embed="rId6">
+            <a:extLst>
+              <a:ext uri="{28A0092B-C50C-407E-A947-70E740481C1C}">
+                <a14:useLocalDpi xmlns:a14="http://schemas.microsoft.com/office/drawing/2010/main" val="0"/>
+              </a:ext>
+              <a:ext uri="{96DAC541-7B7A-43D3-8B79-37D633B846F1}">
+                <asvg:svgBlip xmlns:asvg="http://schemas.microsoft.com/office/drawing/2016/SVG/main" r:embed="rId7"/>
+              </a:ext>
+            </a:extLst>
+          </a:blip>
+          <a:stretch>
+            <a:fillRect/>
+          </a:stretch>
+        </p:blipFill>
+        <p:spPr>
+          <a:xfrm>
+            <a:off x="6590211" y="2367715"/>
+            <a:ext cx="5404621" cy="3805621"/>
+          </a:xfrm>
+          <a:prstGeom prst="rect">
+            <a:avLst/>
+          </a:prstGeom>
+        </p:spPr>
+      </p:pic>
+    </p:spTree>
+    <p:extLst>
+      <p:ext uri="{BB962C8B-B14F-4D97-AF65-F5344CB8AC3E}">
+        <p14:creationId xmlns:p14="http://schemas.microsoft.com/office/powerpoint/2010/main" val="2009185968"/>
+      </p:ext>
+    </p:extLst>
+  </p:cSld>
+  <p:clrMapOvr>
+    <a:masterClrMapping/>
+  </p:clrMapOvr>
+  <mc:AlternateContent xmlns:mc="http://schemas.openxmlformats.org/markup-compatibility/2006" xmlns:p159="http://schemas.microsoft.com/office/powerpoint/2015/09/main">
+    <mc:Choice Requires="p159">
+      <p:transition xmlns:p14="http://schemas.microsoft.com/office/powerpoint/2010/main" spd="slow" p14:dur="2000">
+        <p159:morph option="byObject"/>
+      </p:transition>
+    </mc:Choice>
+    <mc:Fallback xmlns="">
+      <p:transition spd="slow">
+        <p:fade/>
+      </p:transition>
+    </mc:Fallback>
+  </mc:AlternateContent>
+</p:sld>
+</file>
+
+<file path=ppt/slides/slide17.xml><?xml version="1.0" encoding="utf-8"?>
+<p:sld xmlns:a="http://schemas.openxmlformats.org/drawingml/2006/main" xmlns:r="http://schemas.openxmlformats.org/officeDocument/2006/relationships" xmlns:p="http://schemas.openxmlformats.org/presentationml/2006/main">
+  <p:cSld>
+    <p:spTree>
+      <p:nvGrpSpPr>
+        <p:cNvPr id="1" name=""/>
+        <p:cNvGrpSpPr/>
+        <p:nvPr/>
+      </p:nvGrpSpPr>
+      <p:grpSpPr>
+        <a:xfrm>
+          <a:off x="0" y="0"/>
+          <a:ext cx="0" cy="0"/>
+          <a:chOff x="0" y="0"/>
+          <a:chExt cx="0" cy="0"/>
+        </a:xfrm>
+      </p:grpSpPr>
+      <p:pic>
+        <p:nvPicPr>
+          <p:cNvPr id="7" name="Imagem 6">
+            <a:extLst>
+              <a:ext uri="{FF2B5EF4-FFF2-40B4-BE49-F238E27FC236}">
+                <a16:creationId xmlns:a16="http://schemas.microsoft.com/office/drawing/2014/main" id="{15EF5E79-A320-604B-B8D0-BB7CC7F3BD24}"/>
+              </a:ext>
+            </a:extLst>
+          </p:cNvPr>
+          <p:cNvPicPr>
+            <a:picLocks noChangeAspect="1"/>
+          </p:cNvPicPr>
+          <p:nvPr/>
+        </p:nvPicPr>
+        <p:blipFill>
+          <a:blip r:embed="rId3">
+            <a:extLst>
+              <a:ext uri="{28A0092B-C50C-407E-A947-70E740481C1C}">
+                <a14:useLocalDpi xmlns:a14="http://schemas.microsoft.com/office/drawing/2010/main" val="0"/>
+              </a:ext>
+            </a:extLst>
+          </a:blip>
+          <a:stretch>
+            <a:fillRect/>
+          </a:stretch>
+        </p:blipFill>
+        <p:spPr>
+          <a:xfrm>
+            <a:off x="-1" y="0"/>
+            <a:ext cx="12192001" cy="2021978"/>
+          </a:xfrm>
+          <a:prstGeom prst="rect">
+            <a:avLst/>
+          </a:prstGeom>
+        </p:spPr>
+      </p:pic>
+      <p:sp>
+        <p:nvSpPr>
+          <p:cNvPr id="13" name="Título 1">
+            <a:extLst>
+              <a:ext uri="{FF2B5EF4-FFF2-40B4-BE49-F238E27FC236}">
+                <a16:creationId xmlns:a16="http://schemas.microsoft.com/office/drawing/2014/main" id="{94E1A0D2-D048-46FE-90D3-722FBF740CC7}"/>
+              </a:ext>
+            </a:extLst>
+          </p:cNvPr>
+          <p:cNvSpPr>
+            <a:spLocks noGrp="1"/>
+          </p:cNvSpPr>
+          <p:nvPr>
+            <p:ph type="title"/>
+          </p:nvPr>
+        </p:nvSpPr>
+        <p:spPr>
+          <a:xfrm>
+            <a:off x="2159726" y="0"/>
+            <a:ext cx="9292046" cy="2021978"/>
+          </a:xfrm>
+        </p:spPr>
+        <p:txBody>
+          <a:bodyPr>
+            <a:normAutofit/>
+          </a:bodyPr>
+          <a:lstStyle/>
+          <a:p>
+            <a:r>
+              <a:rPr lang="pt-BR" dirty="0">
+                <a:solidFill>
+                  <a:schemeClr val="bg1"/>
+                </a:solidFill>
+                <a:latin typeface="Nunito" pitchFamily="2" charset="77"/>
+              </a:rPr>
+              <a:t>Tipos de Mapeamento</a:t>
+            </a:r>
+          </a:p>
+        </p:txBody>
+      </p:sp>
+      <p:pic>
+        <p:nvPicPr>
+          <p:cNvPr id="14" name="Gráfico 13">
+            <a:extLst>
+              <a:ext uri="{FF2B5EF4-FFF2-40B4-BE49-F238E27FC236}">
+                <a16:creationId xmlns:a16="http://schemas.microsoft.com/office/drawing/2014/main" id="{2B5477E9-00BA-4494-BA1B-5466AC45994D}"/>
+              </a:ext>
+            </a:extLst>
+          </p:cNvPr>
+          <p:cNvPicPr>
+            <a:picLocks noChangeAspect="1"/>
+          </p:cNvPicPr>
+          <p:nvPr/>
+        </p:nvPicPr>
+        <p:blipFill>
+          <a:blip r:embed="rId4">
+            <a:extLst>
+              <a:ext uri="{96DAC541-7B7A-43D3-8B79-37D633B846F1}">
+                <asvg:svgBlip xmlns:asvg="http://schemas.microsoft.com/office/drawing/2016/SVG/main" r:embed="rId5"/>
+              </a:ext>
+            </a:extLst>
+          </a:blip>
+          <a:stretch>
+            <a:fillRect/>
+          </a:stretch>
+        </p:blipFill>
+        <p:spPr>
+          <a:xfrm>
+            <a:off x="1097280" y="636835"/>
+            <a:ext cx="610307" cy="705667"/>
+          </a:xfrm>
+          <a:prstGeom prst="rect">
+            <a:avLst/>
+          </a:prstGeom>
+        </p:spPr>
+      </p:pic>
+      <p:sp>
+        <p:nvSpPr>
+          <p:cNvPr id="8" name="CaixaDeTexto 7">
+            <a:extLst>
+              <a:ext uri="{FF2B5EF4-FFF2-40B4-BE49-F238E27FC236}">
+                <a16:creationId xmlns:a16="http://schemas.microsoft.com/office/drawing/2014/main" id="{29557DB5-A419-464F-8DE1-FE557705DF73}"/>
+              </a:ext>
+            </a:extLst>
+          </p:cNvPr>
+          <p:cNvSpPr txBox="1"/>
+          <p:nvPr/>
+        </p:nvSpPr>
+        <p:spPr>
+          <a:xfrm>
+            <a:off x="1097280" y="2719343"/>
+            <a:ext cx="6400800" cy="4801314"/>
+          </a:xfrm>
+          <a:prstGeom prst="rect">
+            <a:avLst/>
+          </a:prstGeom>
+          <a:noFill/>
+        </p:spPr>
+        <p:txBody>
+          <a:bodyPr wrap="square" rtlCol="0">
+            <a:spAutoFit/>
+          </a:bodyPr>
+          <a:lstStyle/>
+          <a:p>
+            <a:r>
+              <a:rPr lang="pt-BR" b="1" dirty="0">
+                <a:latin typeface="Nunito" pitchFamily="2" charset="77"/>
+              </a:rPr>
+              <a:t>Tipos</a:t>
+            </a:r>
+          </a:p>
+          <a:p>
+            <a:pPr marL="285750" indent="-285750">
+              <a:buFontTx/>
+              <a:buChar char="-"/>
+            </a:pPr>
+            <a:r>
+              <a:rPr lang="en-US" dirty="0">
+                <a:latin typeface="Nunito" pitchFamily="2" charset="77"/>
+              </a:rPr>
+              <a:t>Fluent Mapping</a:t>
+            </a:r>
+          </a:p>
+          <a:p>
+            <a:pPr marL="742950" lvl="1" indent="-285750">
+              <a:buFontTx/>
+              <a:buChar char="-"/>
+            </a:pPr>
+            <a:r>
+              <a:rPr lang="en-US" dirty="0" err="1">
+                <a:latin typeface="Nunito" pitchFamily="2" charset="77"/>
+              </a:rPr>
+              <a:t>Mapeamento</a:t>
+            </a:r>
+            <a:r>
+              <a:rPr lang="en-US" dirty="0">
+                <a:latin typeface="Nunito" pitchFamily="2" charset="77"/>
+              </a:rPr>
+              <a:t> </a:t>
+            </a:r>
+            <a:r>
+              <a:rPr lang="en-US" dirty="0" err="1">
+                <a:latin typeface="Nunito" pitchFamily="2" charset="77"/>
+              </a:rPr>
+              <a:t>fluente</a:t>
+            </a:r>
+            <a:endParaRPr lang="en-US" dirty="0">
+              <a:latin typeface="Nunito" pitchFamily="2" charset="77"/>
+            </a:endParaRPr>
+          </a:p>
+          <a:p>
+            <a:pPr marL="742950" lvl="1" indent="-285750">
+              <a:buFontTx/>
+              <a:buChar char="-"/>
+            </a:pPr>
+            <a:r>
+              <a:rPr lang="en-US" dirty="0" err="1">
+                <a:latin typeface="Nunito" pitchFamily="2" charset="77"/>
+              </a:rPr>
+              <a:t>Feito</a:t>
+            </a:r>
+            <a:r>
+              <a:rPr lang="en-US" dirty="0">
+                <a:latin typeface="Nunito" pitchFamily="2" charset="77"/>
+              </a:rPr>
+              <a:t> </a:t>
+            </a:r>
+            <a:r>
+              <a:rPr lang="en-US" dirty="0" err="1">
+                <a:latin typeface="Nunito" pitchFamily="2" charset="77"/>
+              </a:rPr>
+              <a:t>em</a:t>
+            </a:r>
+            <a:r>
+              <a:rPr lang="en-US" dirty="0">
+                <a:latin typeface="Nunito" pitchFamily="2" charset="77"/>
+              </a:rPr>
+              <a:t> </a:t>
+            </a:r>
+            <a:r>
+              <a:rPr lang="en-US" dirty="0" err="1">
+                <a:latin typeface="Nunito" pitchFamily="2" charset="77"/>
+              </a:rPr>
+              <a:t>uma</a:t>
+            </a:r>
+            <a:r>
+              <a:rPr lang="en-US" dirty="0">
+                <a:latin typeface="Nunito" pitchFamily="2" charset="77"/>
+              </a:rPr>
+              <a:t> </a:t>
+            </a:r>
+            <a:r>
+              <a:rPr lang="en-US" dirty="0" err="1">
+                <a:latin typeface="Nunito" pitchFamily="2" charset="77"/>
+              </a:rPr>
+              <a:t>classe</a:t>
+            </a:r>
+            <a:r>
+              <a:rPr lang="en-US" dirty="0">
+                <a:latin typeface="Nunito" pitchFamily="2" charset="77"/>
+              </a:rPr>
+              <a:t> externa</a:t>
+            </a:r>
+          </a:p>
+          <a:p>
+            <a:pPr marL="742950" lvl="1" indent="-285750">
+              <a:buFontTx/>
+              <a:buChar char="-"/>
+            </a:pPr>
+            <a:r>
+              <a:rPr lang="en-US" dirty="0" err="1">
+                <a:latin typeface="Nunito" pitchFamily="2" charset="77"/>
+              </a:rPr>
+              <a:t>Não</a:t>
+            </a:r>
+            <a:r>
+              <a:rPr lang="en-US" dirty="0">
+                <a:latin typeface="Nunito" pitchFamily="2" charset="77"/>
+              </a:rPr>
+              <a:t> “</a:t>
+            </a:r>
+            <a:r>
+              <a:rPr lang="en-US" dirty="0" err="1">
+                <a:latin typeface="Nunito" pitchFamily="2" charset="77"/>
+              </a:rPr>
+              <a:t>polui</a:t>
+            </a:r>
+            <a:r>
+              <a:rPr lang="en-US" dirty="0">
+                <a:latin typeface="Nunito" pitchFamily="2" charset="77"/>
+              </a:rPr>
+              <a:t>” a </a:t>
+            </a:r>
+            <a:r>
+              <a:rPr lang="en-US" dirty="0" err="1">
+                <a:latin typeface="Nunito" pitchFamily="2" charset="77"/>
+              </a:rPr>
+              <a:t>classe</a:t>
+            </a:r>
+            <a:r>
+              <a:rPr lang="en-US" dirty="0">
+                <a:latin typeface="Nunito" pitchFamily="2" charset="77"/>
+              </a:rPr>
+              <a:t> principal</a:t>
+            </a:r>
+          </a:p>
+          <a:p>
+            <a:pPr marL="742950" lvl="1" indent="-285750">
+              <a:buFontTx/>
+              <a:buChar char="-"/>
+            </a:pPr>
+            <a:r>
+              <a:rPr lang="en-US" dirty="0" err="1">
+                <a:latin typeface="Nunito" pitchFamily="2" charset="77"/>
+              </a:rPr>
+              <a:t>Não</a:t>
+            </a:r>
+            <a:r>
+              <a:rPr lang="en-US" dirty="0">
+                <a:latin typeface="Nunito" pitchFamily="2" charset="77"/>
+              </a:rPr>
+              <a:t> </a:t>
+            </a:r>
+            <a:r>
+              <a:rPr lang="en-US" dirty="0" err="1">
+                <a:latin typeface="Nunito" pitchFamily="2" charset="77"/>
+              </a:rPr>
+              <a:t>cria</a:t>
+            </a:r>
+            <a:r>
+              <a:rPr lang="en-US" dirty="0">
+                <a:latin typeface="Nunito" pitchFamily="2" charset="77"/>
+              </a:rPr>
+              <a:t> </a:t>
+            </a:r>
+            <a:r>
+              <a:rPr lang="en-US" dirty="0" err="1">
+                <a:latin typeface="Nunito" pitchFamily="2" charset="77"/>
+              </a:rPr>
+              <a:t>dependências</a:t>
+            </a:r>
+            <a:r>
+              <a:rPr lang="en-US" dirty="0">
+                <a:latin typeface="Nunito" pitchFamily="2" charset="77"/>
+              </a:rPr>
+              <a:t> </a:t>
+            </a:r>
+            <a:r>
+              <a:rPr lang="en-US" dirty="0" err="1">
+                <a:latin typeface="Nunito" pitchFamily="2" charset="77"/>
+              </a:rPr>
+              <a:t>na</a:t>
+            </a:r>
+            <a:r>
+              <a:rPr lang="en-US" dirty="0">
+                <a:latin typeface="Nunito" pitchFamily="2" charset="77"/>
+              </a:rPr>
+              <a:t> </a:t>
+            </a:r>
+            <a:r>
+              <a:rPr lang="en-US" dirty="0" err="1">
+                <a:latin typeface="Nunito" pitchFamily="2" charset="77"/>
+              </a:rPr>
+              <a:t>classe</a:t>
+            </a:r>
+            <a:r>
+              <a:rPr lang="en-US" dirty="0">
+                <a:latin typeface="Nunito" pitchFamily="2" charset="77"/>
+              </a:rPr>
+              <a:t>/</a:t>
+            </a:r>
+            <a:r>
+              <a:rPr lang="en-US" dirty="0" err="1">
+                <a:latin typeface="Nunito" pitchFamily="2" charset="77"/>
+              </a:rPr>
+              <a:t>projeto</a:t>
+            </a:r>
+            <a:r>
+              <a:rPr lang="en-US" dirty="0">
+                <a:latin typeface="Nunito" pitchFamily="2" charset="77"/>
+              </a:rPr>
+              <a:t> principal</a:t>
+            </a:r>
+          </a:p>
+          <a:p>
+            <a:pPr marL="285750" indent="-285750">
+              <a:buFontTx/>
+              <a:buChar char="-"/>
+            </a:pPr>
+            <a:r>
+              <a:rPr lang="en-US" dirty="0">
+                <a:latin typeface="Nunito" pitchFamily="2" charset="77"/>
+              </a:rPr>
+              <a:t>Data Annotations</a:t>
+            </a:r>
+          </a:p>
+          <a:p>
+            <a:pPr marL="742950" lvl="1" indent="-285750">
+              <a:buFontTx/>
+              <a:buChar char="-"/>
+            </a:pPr>
+            <a:r>
+              <a:rPr lang="en-US" dirty="0" err="1">
+                <a:latin typeface="Nunito" pitchFamily="2" charset="77"/>
+              </a:rPr>
+              <a:t>Feitos</a:t>
+            </a:r>
+            <a:r>
+              <a:rPr lang="en-US" dirty="0">
+                <a:latin typeface="Nunito" pitchFamily="2" charset="77"/>
+              </a:rPr>
+              <a:t> </a:t>
+            </a:r>
+            <a:r>
+              <a:rPr lang="en-US" dirty="0" err="1">
+                <a:latin typeface="Nunito" pitchFamily="2" charset="77"/>
+              </a:rPr>
+              <a:t>diretamente</a:t>
+            </a:r>
+            <a:r>
+              <a:rPr lang="en-US" dirty="0">
+                <a:latin typeface="Nunito" pitchFamily="2" charset="77"/>
+              </a:rPr>
+              <a:t> </a:t>
+            </a:r>
+            <a:r>
+              <a:rPr lang="en-US" dirty="0" err="1">
+                <a:latin typeface="Nunito" pitchFamily="2" charset="77"/>
+              </a:rPr>
+              <a:t>nas</a:t>
+            </a:r>
+            <a:r>
+              <a:rPr lang="en-US" dirty="0">
+                <a:latin typeface="Nunito" pitchFamily="2" charset="77"/>
+              </a:rPr>
+              <a:t> classes</a:t>
+            </a:r>
+          </a:p>
+          <a:p>
+            <a:pPr marL="742950" lvl="1" indent="-285750">
+              <a:buFontTx/>
+              <a:buChar char="-"/>
+            </a:pPr>
+            <a:r>
+              <a:rPr lang="en-US" dirty="0" err="1">
+                <a:latin typeface="Nunito" pitchFamily="2" charset="77"/>
+              </a:rPr>
+              <a:t>Mais</a:t>
+            </a:r>
+            <a:r>
+              <a:rPr lang="en-US" dirty="0">
+                <a:latin typeface="Nunito" pitchFamily="2" charset="77"/>
+              </a:rPr>
+              <a:t> simples e </a:t>
+            </a:r>
+            <a:r>
+              <a:rPr lang="en-US" dirty="0" err="1">
+                <a:latin typeface="Nunito" pitchFamily="2" charset="77"/>
+              </a:rPr>
+              <a:t>diretos</a:t>
+            </a:r>
+            <a:endParaRPr lang="en-US" dirty="0">
+              <a:latin typeface="Nunito" pitchFamily="2" charset="77"/>
+            </a:endParaRPr>
+          </a:p>
+          <a:p>
+            <a:pPr marL="742950" lvl="1" indent="-285750">
+              <a:buFontTx/>
+              <a:buChar char="-"/>
+            </a:pPr>
+            <a:r>
+              <a:rPr lang="en-US" dirty="0" err="1">
+                <a:latin typeface="Nunito" pitchFamily="2" charset="77"/>
+              </a:rPr>
+              <a:t>Dependem</a:t>
+            </a:r>
+            <a:r>
+              <a:rPr lang="en-US" dirty="0">
+                <a:latin typeface="Nunito" pitchFamily="2" charset="77"/>
+              </a:rPr>
+              <a:t> do </a:t>
+            </a:r>
+            <a:r>
+              <a:rPr lang="en-US" dirty="0" err="1">
+                <a:latin typeface="Nunito" pitchFamily="2" charset="77"/>
+              </a:rPr>
+              <a:t>System.ComponentModel.DataAnnotations</a:t>
+            </a:r>
+            <a:endParaRPr lang="en-US" dirty="0">
+              <a:latin typeface="Nunito" pitchFamily="2" charset="77"/>
+            </a:endParaRPr>
+          </a:p>
+          <a:p>
+            <a:pPr marL="1200150" lvl="2" indent="-285750">
+              <a:buFontTx/>
+              <a:buChar char="-"/>
+            </a:pPr>
+            <a:r>
+              <a:rPr lang="en-US" dirty="0" err="1">
+                <a:latin typeface="Nunito" pitchFamily="2" charset="77"/>
+              </a:rPr>
+              <a:t>Alguns</a:t>
+            </a:r>
+            <a:r>
+              <a:rPr lang="en-US" dirty="0">
+                <a:latin typeface="Nunito" pitchFamily="2" charset="77"/>
+              </a:rPr>
+              <a:t> </a:t>
+            </a:r>
+            <a:r>
+              <a:rPr lang="en-US" dirty="0" err="1">
+                <a:latin typeface="Nunito" pitchFamily="2" charset="77"/>
+              </a:rPr>
+              <a:t>dependem</a:t>
+            </a:r>
+            <a:r>
+              <a:rPr lang="en-US" dirty="0">
+                <a:latin typeface="Nunito" pitchFamily="2" charset="77"/>
+              </a:rPr>
+              <a:t> do </a:t>
+            </a:r>
+            <a:r>
+              <a:rPr lang="en-US" dirty="0" err="1">
+                <a:latin typeface="Nunito" pitchFamily="2" charset="77"/>
+              </a:rPr>
+              <a:t>Microsoft.EntityFrameworkCore</a:t>
+            </a:r>
+            <a:r>
+              <a:rPr lang="en-US" dirty="0">
+                <a:latin typeface="Nunito" pitchFamily="2" charset="77"/>
+              </a:rPr>
+              <a:t> </a:t>
+            </a:r>
+            <a:r>
+              <a:rPr lang="en-US" dirty="0" err="1">
+                <a:latin typeface="Nunito" pitchFamily="2" charset="77"/>
+              </a:rPr>
+              <a:t>também</a:t>
+            </a:r>
+            <a:endParaRPr lang="en-US" dirty="0">
+              <a:latin typeface="Nunito" pitchFamily="2" charset="77"/>
+            </a:endParaRPr>
+          </a:p>
+          <a:p>
+            <a:pPr marL="285750" indent="-285750">
+              <a:buFontTx/>
+              <a:buChar char="-"/>
+            </a:pPr>
+            <a:endParaRPr lang="en-US" dirty="0">
+              <a:latin typeface="Montserrat Light" panose="00000400000000000000" pitchFamily="2" charset="0"/>
+            </a:endParaRPr>
+          </a:p>
+          <a:p>
+            <a:pPr marL="285750" indent="-285750">
+              <a:buFontTx/>
+              <a:buChar char="-"/>
+            </a:pPr>
+            <a:endParaRPr lang="en-US" dirty="0">
+              <a:latin typeface="Montserrat Light" panose="00000400000000000000" pitchFamily="2" charset="0"/>
+            </a:endParaRPr>
+          </a:p>
+          <a:p>
+            <a:pPr marL="285750" indent="-285750">
+              <a:buFontTx/>
+              <a:buChar char="-"/>
+            </a:pPr>
+            <a:endParaRPr lang="pt-BR" dirty="0">
+              <a:latin typeface="Montserrat Light" panose="00000400000000000000" pitchFamily="2" charset="0"/>
+            </a:endParaRPr>
+          </a:p>
+          <a:p>
+            <a:pPr marL="285750" indent="-285750">
+              <a:buFontTx/>
+              <a:buChar char="-"/>
+            </a:pPr>
+            <a:endParaRPr lang="pt-BR" dirty="0">
+              <a:latin typeface="Montserrat Light" panose="00000400000000000000" pitchFamily="2" charset="0"/>
+            </a:endParaRPr>
+          </a:p>
+        </p:txBody>
+      </p:sp>
+      <p:pic>
+        <p:nvPicPr>
+          <p:cNvPr id="4" name="Gráfico 3">
+            <a:extLst>
+              <a:ext uri="{FF2B5EF4-FFF2-40B4-BE49-F238E27FC236}">
+                <a16:creationId xmlns:a16="http://schemas.microsoft.com/office/drawing/2014/main" id="{A59E6B2B-25FB-4AE5-8268-83A14DE64D3A}"/>
+              </a:ext>
+            </a:extLst>
+          </p:cNvPr>
+          <p:cNvPicPr>
+            <a:picLocks noChangeAspect="1"/>
+          </p:cNvPicPr>
+          <p:nvPr/>
+        </p:nvPicPr>
+        <p:blipFill>
+          <a:blip r:embed="rId6">
+            <a:extLst>
+              <a:ext uri="{28A0092B-C50C-407E-A947-70E740481C1C}">
+                <a14:useLocalDpi xmlns:a14="http://schemas.microsoft.com/office/drawing/2010/main" val="0"/>
+              </a:ext>
+              <a:ext uri="{96DAC541-7B7A-43D3-8B79-37D633B846F1}">
+                <asvg:svgBlip xmlns:asvg="http://schemas.microsoft.com/office/drawing/2016/SVG/main" r:embed="rId7"/>
+              </a:ext>
+            </a:extLst>
+          </a:blip>
+          <a:stretch>
+            <a:fillRect/>
+          </a:stretch>
+        </p:blipFill>
+        <p:spPr>
+          <a:xfrm>
+            <a:off x="7213963" y="2364377"/>
+            <a:ext cx="4847771" cy="3657600"/>
+          </a:xfrm>
+          <a:prstGeom prst="rect">
+            <a:avLst/>
+          </a:prstGeom>
+        </p:spPr>
+      </p:pic>
+    </p:spTree>
+    <p:extLst>
+      <p:ext uri="{BB962C8B-B14F-4D97-AF65-F5344CB8AC3E}">
+        <p14:creationId xmlns:p14="http://schemas.microsoft.com/office/powerpoint/2010/main" val="1191562484"/>
+      </p:ext>
+    </p:extLst>
+  </p:cSld>
+  <p:clrMapOvr>
+    <a:masterClrMapping/>
+  </p:clrMapOvr>
+  <mc:AlternateContent xmlns:mc="http://schemas.openxmlformats.org/markup-compatibility/2006" xmlns:p159="http://schemas.microsoft.com/office/powerpoint/2015/09/main">
+    <mc:Choice Requires="p159">
+      <p:transition xmlns:p14="http://schemas.microsoft.com/office/powerpoint/2010/main" spd="slow" p14:dur="2000">
+        <p159:morph option="byObject"/>
+      </p:transition>
+    </mc:Choice>
+    <mc:Fallback xmlns="">
+      <p:transition spd="slow">
+        <p:fade/>
+      </p:transition>
+    </mc:Fallback>
+  </mc:AlternateContent>
+</p:sld>
+</file>
+
+<file path=ppt/slides/slide18.xml><?xml version="1.0" encoding="utf-8"?>
+<p:sld xmlns:a="http://schemas.openxmlformats.org/drawingml/2006/main" xmlns:r="http://schemas.openxmlformats.org/officeDocument/2006/relationships" xmlns:p="http://schemas.openxmlformats.org/presentationml/2006/main">
+  <p:cSld>
+    <p:spTree>
+      <p:nvGrpSpPr>
+        <p:cNvPr id="1" name=""/>
+        <p:cNvGrpSpPr/>
+        <p:nvPr/>
+      </p:nvGrpSpPr>
+      <p:grpSpPr>
+        <a:xfrm>
+          <a:off x="0" y="0"/>
+          <a:ext cx="0" cy="0"/>
+          <a:chOff x="0" y="0"/>
+          <a:chExt cx="0" cy="0"/>
+        </a:xfrm>
+      </p:grpSpPr>
+      <p:pic>
+        <p:nvPicPr>
+          <p:cNvPr id="5" name="Espaço Reservado para Conteúdo 4">
+            <a:extLst>
+              <a:ext uri="{FF2B5EF4-FFF2-40B4-BE49-F238E27FC236}">
+                <a16:creationId xmlns:a16="http://schemas.microsoft.com/office/drawing/2014/main" id="{DEBCF998-65B9-41B2-A535-E5741DD64BE5}"/>
+              </a:ext>
+            </a:extLst>
+          </p:cNvPr>
+          <p:cNvPicPr>
+            <a:picLocks noGrp="1" noChangeAspect="1"/>
+          </p:cNvPicPr>
+          <p:nvPr>
+            <p:ph idx="1"/>
+          </p:nvPr>
+        </p:nvPicPr>
+        <p:blipFill>
           <a:blip r:embed="rId2">
             <a:extLst>
               <a:ext uri="{28A0092B-C50C-407E-A947-70E740481C1C}">
@@ -11488,13 +15324,13 @@
   <p:clrMapOvr>
     <a:masterClrMapping/>
   </p:clrMapOvr>
-  <mc:AlternateContent xmlns:mc="http://schemas.openxmlformats.org/markup-compatibility/2006">
-    <mc:Choice xmlns:p159="http://schemas.microsoft.com/office/powerpoint/2015/09/main" Requires="p159">
+  <mc:AlternateContent xmlns:mc="http://schemas.openxmlformats.org/markup-compatibility/2006" xmlns:p159="http://schemas.microsoft.com/office/powerpoint/2015/09/main">
+    <mc:Choice Requires="p159">
       <p:transition xmlns:p14="http://schemas.microsoft.com/office/powerpoint/2010/main" spd="slow" p14:dur="2000">
         <p159:morph option="byObject"/>
       </p:transition>
     </mc:Choice>
-    <mc:Fallback>
+    <mc:Fallback xmlns="">
       <p:transition spd="slow">
         <p:fade/>
       </p:transition>
@@ -12477,13 +16313,13 @@
   <p:clrMapOvr>
     <a:masterClrMapping/>
   </p:clrMapOvr>
-  <mc:AlternateContent xmlns:mc="http://schemas.openxmlformats.org/markup-compatibility/2006">
-    <mc:Choice xmlns:p159="http://schemas.microsoft.com/office/powerpoint/2015/09/main" Requires="p159">
+  <mc:AlternateContent xmlns:mc="http://schemas.openxmlformats.org/markup-compatibility/2006" xmlns:p159="http://schemas.microsoft.com/office/powerpoint/2015/09/main">
+    <mc:Choice Requires="p159">
       <p:transition xmlns:p14="http://schemas.microsoft.com/office/powerpoint/2010/main" spd="slow" p14:dur="2000">
         <p159:morph option="byObject"/>
       </p:transition>
     </mc:Choice>
-    <mc:Fallback>
+    <mc:Fallback xmlns="">
       <p:transition spd="slow">
         <p:fade/>
       </p:transition>

</xml_diff>